<commit_message>
nearly finished first page of potentialtheorie
</commit_message>
<xml_diff>
--- a/Strömungslehre 2/images/SL2-Images.pptx
+++ b/Strömungslehre 2/images/SL2-Images.pptx
@@ -11,6 +11,7 @@
     <p:sldId id="259" r:id="rId5"/>
     <p:sldId id="260" r:id="rId6"/>
     <p:sldId id="261" r:id="rId7"/>
+    <p:sldId id="262" r:id="rId8"/>
   </p:sldIdLst>
   <p:sldSz cx="3600450" cy="3600450"/>
   <p:notesSz cx="6858000" cy="9144000"/>
@@ -14091,6 +14092,3673 @@
 </p:sld>
 </file>
 
+<file path=ppt/slides/slide7.xml><?xml version="1.0" encoding="utf-8"?>
+<p:sld xmlns:a="http://schemas.openxmlformats.org/drawingml/2006/main" xmlns:r="http://schemas.openxmlformats.org/officeDocument/2006/relationships" xmlns:p="http://schemas.openxmlformats.org/presentationml/2006/main">
+  <p:cSld>
+    <p:spTree>
+      <p:nvGrpSpPr>
+        <p:cNvPr id="1" name="">
+          <a:extLst>
+            <a:ext uri="{FF2B5EF4-FFF2-40B4-BE49-F238E27FC236}">
+              <a16:creationId xmlns:a16="http://schemas.microsoft.com/office/drawing/2014/main" id="{D7D42841-1AF1-9EA1-1BAA-B00A6B8E06FE}"/>
+            </a:ext>
+          </a:extLst>
+        </p:cNvPr>
+        <p:cNvGrpSpPr/>
+        <p:nvPr/>
+      </p:nvGrpSpPr>
+      <p:grpSpPr>
+        <a:xfrm>
+          <a:off x="0" y="0"/>
+          <a:ext cx="0" cy="0"/>
+          <a:chOff x="0" y="0"/>
+          <a:chExt cx="0" cy="0"/>
+        </a:xfrm>
+      </p:grpSpPr>
+      <p:sp>
+        <p:nvSpPr>
+          <p:cNvPr id="8" name="Textfeld 7">
+            <a:extLst>
+              <a:ext uri="{FF2B5EF4-FFF2-40B4-BE49-F238E27FC236}">
+                <a16:creationId xmlns:a16="http://schemas.microsoft.com/office/drawing/2014/main" id="{A571117E-A7C6-A7C6-6F39-7C89F4F53678}"/>
+              </a:ext>
+            </a:extLst>
+          </p:cNvPr>
+          <p:cNvSpPr txBox="1"/>
+          <p:nvPr/>
+        </p:nvSpPr>
+        <p:spPr>
+          <a:xfrm>
+            <a:off x="2791800" y="2091580"/>
+            <a:ext cx="484119" cy="369332"/>
+          </a:xfrm>
+          <a:prstGeom prst="rect">
+            <a:avLst/>
+          </a:prstGeom>
+          <a:noFill/>
+        </p:spPr>
+        <p:txBody>
+          <a:bodyPr wrap="square" rtlCol="0">
+            <a:spAutoFit/>
+          </a:bodyPr>
+          <a:lstStyle/>
+          <a:p>
+            <a:pPr algn="ctr"/>
+            <a:r>
+              <a:rPr lang="de-DE" i="1" dirty="0">
+                <a:latin typeface="CMU Serif" panose="02000603000000000000" pitchFamily="2" charset="0"/>
+                <a:ea typeface="CMU Serif" panose="02000603000000000000" pitchFamily="2" charset="0"/>
+                <a:cs typeface="CMU Serif" panose="02000603000000000000" pitchFamily="2" charset="0"/>
+              </a:rPr>
+              <a:t>x</a:t>
+            </a:r>
+          </a:p>
+        </p:txBody>
+      </p:sp>
+      <p:sp>
+        <p:nvSpPr>
+          <p:cNvPr id="36" name="Textfeld 35">
+            <a:extLst>
+              <a:ext uri="{FF2B5EF4-FFF2-40B4-BE49-F238E27FC236}">
+                <a16:creationId xmlns:a16="http://schemas.microsoft.com/office/drawing/2014/main" id="{F1E1E5CA-3D6B-71D3-B083-F7C2808B7863}"/>
+              </a:ext>
+            </a:extLst>
+          </p:cNvPr>
+          <p:cNvSpPr txBox="1"/>
+          <p:nvPr/>
+        </p:nvSpPr>
+        <p:spPr>
+          <a:xfrm>
+            <a:off x="734724" y="1912227"/>
+            <a:ext cx="353054" cy="369332"/>
+          </a:xfrm>
+          <a:prstGeom prst="rect">
+            <a:avLst/>
+          </a:prstGeom>
+          <a:noFill/>
+        </p:spPr>
+        <p:txBody>
+          <a:bodyPr wrap="square" rtlCol="0">
+            <a:spAutoFit/>
+          </a:bodyPr>
+          <a:lstStyle/>
+          <a:p>
+            <a:pPr algn="ctr"/>
+            <a:r>
+              <a:rPr lang="el-GR" i="1" dirty="0">
+                <a:solidFill>
+                  <a:schemeClr val="tx1">
+                    <a:lumMod val="65000"/>
+                    <a:lumOff val="35000"/>
+                  </a:schemeClr>
+                </a:solidFill>
+                <a:latin typeface="CMU Serif Extra" panose="02000603000000000000" pitchFamily="2" charset="0"/>
+                <a:ea typeface="CMU Serif Extra" panose="02000603000000000000" pitchFamily="2" charset="0"/>
+                <a:cs typeface="CMU Serif Extra" panose="02000603000000000000" pitchFamily="2" charset="0"/>
+              </a:rPr>
+              <a:t>ϑ</a:t>
+            </a:r>
+            <a:endParaRPr lang="de-DE" i="1" u="sng" dirty="0">
+              <a:solidFill>
+                <a:schemeClr val="tx1">
+                  <a:lumMod val="65000"/>
+                  <a:lumOff val="35000"/>
+                </a:schemeClr>
+              </a:solidFill>
+              <a:latin typeface="CMU Serif Extra" panose="02000603000000000000" pitchFamily="2" charset="0"/>
+              <a:ea typeface="CMU Serif Extra" panose="02000603000000000000" pitchFamily="2" charset="0"/>
+              <a:cs typeface="CMU Serif Extra" panose="02000603000000000000" pitchFamily="2" charset="0"/>
+            </a:endParaRPr>
+          </a:p>
+        </p:txBody>
+      </p:sp>
+      <p:cxnSp>
+        <p:nvCxnSpPr>
+          <p:cNvPr id="55" name="Gerader Verbinder 54">
+            <a:extLst>
+              <a:ext uri="{FF2B5EF4-FFF2-40B4-BE49-F238E27FC236}">
+                <a16:creationId xmlns:a16="http://schemas.microsoft.com/office/drawing/2014/main" id="{A3A7E3FB-1441-FFCB-59F0-AF8C9CBBD68C}"/>
+              </a:ext>
+            </a:extLst>
+          </p:cNvPr>
+          <p:cNvCxnSpPr>
+            <a:cxnSpLocks/>
+          </p:cNvCxnSpPr>
+          <p:nvPr/>
+        </p:nvCxnSpPr>
+        <p:spPr>
+          <a:xfrm>
+            <a:off x="1133632" y="2282248"/>
+            <a:ext cx="127820" cy="195448"/>
+          </a:xfrm>
+          <a:prstGeom prst="line">
+            <a:avLst/>
+          </a:prstGeom>
+          <a:ln w="12700" cap="rnd">
+            <a:solidFill>
+              <a:schemeClr val="tx1"/>
+            </a:solidFill>
+            <a:round/>
+          </a:ln>
+        </p:spPr>
+        <p:style>
+          <a:lnRef idx="2">
+            <a:schemeClr val="accent1"/>
+          </a:lnRef>
+          <a:fillRef idx="0">
+            <a:schemeClr val="accent1"/>
+          </a:fillRef>
+          <a:effectRef idx="1">
+            <a:schemeClr val="accent1"/>
+          </a:effectRef>
+          <a:fontRef idx="minor">
+            <a:schemeClr val="tx1"/>
+          </a:fontRef>
+        </p:style>
+      </p:cxnSp>
+      <p:cxnSp>
+        <p:nvCxnSpPr>
+          <p:cNvPr id="5" name="Gerader Verbinder 4">
+            <a:extLst>
+              <a:ext uri="{FF2B5EF4-FFF2-40B4-BE49-F238E27FC236}">
+                <a16:creationId xmlns:a16="http://schemas.microsoft.com/office/drawing/2014/main" id="{B0C2C4EB-812A-90F4-8AD9-A127A9632895}"/>
+              </a:ext>
+            </a:extLst>
+          </p:cNvPr>
+          <p:cNvCxnSpPr>
+            <a:cxnSpLocks/>
+          </p:cNvCxnSpPr>
+          <p:nvPr/>
+        </p:nvCxnSpPr>
+        <p:spPr>
+          <a:xfrm flipH="1">
+            <a:off x="329391" y="2280826"/>
+            <a:ext cx="804241" cy="0"/>
+          </a:xfrm>
+          <a:prstGeom prst="line">
+            <a:avLst/>
+          </a:prstGeom>
+          <a:ln w="12700" cap="rnd">
+            <a:solidFill>
+              <a:schemeClr val="tx1">
+                <a:lumMod val="65000"/>
+                <a:lumOff val="35000"/>
+              </a:schemeClr>
+            </a:solidFill>
+            <a:round/>
+          </a:ln>
+        </p:spPr>
+        <p:style>
+          <a:lnRef idx="2">
+            <a:schemeClr val="accent1"/>
+          </a:lnRef>
+          <a:fillRef idx="0">
+            <a:schemeClr val="accent1"/>
+          </a:fillRef>
+          <a:effectRef idx="1">
+            <a:schemeClr val="accent1"/>
+          </a:effectRef>
+          <a:fontRef idx="minor">
+            <a:schemeClr val="tx1"/>
+          </a:fontRef>
+        </p:style>
+      </p:cxnSp>
+      <p:sp>
+        <p:nvSpPr>
+          <p:cNvPr id="35" name="Bogen 34">
+            <a:extLst>
+              <a:ext uri="{FF2B5EF4-FFF2-40B4-BE49-F238E27FC236}">
+                <a16:creationId xmlns:a16="http://schemas.microsoft.com/office/drawing/2014/main" id="{A7FB58F3-80D4-2913-F3FD-49E3CD46E0B2}"/>
+              </a:ext>
+            </a:extLst>
+          </p:cNvPr>
+          <p:cNvSpPr/>
+          <p:nvPr/>
+        </p:nvSpPr>
+        <p:spPr>
+          <a:xfrm>
+            <a:off x="669513" y="1849946"/>
+            <a:ext cx="876546" cy="861914"/>
+          </a:xfrm>
+          <a:prstGeom prst="arc">
+            <a:avLst>
+              <a:gd name="adj1" fmla="val 10800594"/>
+              <a:gd name="adj2" fmla="val 17776719"/>
+            </a:avLst>
+          </a:prstGeom>
+          <a:noFill/>
+          <a:ln w="12700" cap="rnd">
+            <a:solidFill>
+              <a:schemeClr val="tx1">
+                <a:lumMod val="65000"/>
+                <a:lumOff val="35000"/>
+              </a:schemeClr>
+            </a:solidFill>
+            <a:round/>
+            <a:headEnd type="stealth" w="med" len="med"/>
+            <a:tailEnd type="stealth" w="med" len="med"/>
+          </a:ln>
+        </p:spPr>
+        <p:style>
+          <a:lnRef idx="2">
+            <a:schemeClr val="dk1"/>
+          </a:lnRef>
+          <a:fillRef idx="0">
+            <a:schemeClr val="dk1"/>
+          </a:fillRef>
+          <a:effectRef idx="1">
+            <a:schemeClr val="dk1"/>
+          </a:effectRef>
+          <a:fontRef idx="minor">
+            <a:schemeClr val="tx1"/>
+          </a:fontRef>
+        </p:style>
+        <p:txBody>
+          <a:bodyPr rtlCol="0" anchor="ctr"/>
+          <a:lstStyle/>
+          <a:p>
+            <a:pPr algn="ctr"/>
+            <a:endParaRPr lang="de-DE"/>
+          </a:p>
+        </p:txBody>
+      </p:sp>
+      <p:cxnSp>
+        <p:nvCxnSpPr>
+          <p:cNvPr id="6" name="Gerader Verbinder 5">
+            <a:extLst>
+              <a:ext uri="{FF2B5EF4-FFF2-40B4-BE49-F238E27FC236}">
+                <a16:creationId xmlns:a16="http://schemas.microsoft.com/office/drawing/2014/main" id="{C68A3746-682B-EEB3-446B-8169FA97A567}"/>
+              </a:ext>
+            </a:extLst>
+          </p:cNvPr>
+          <p:cNvCxnSpPr>
+            <a:cxnSpLocks/>
+          </p:cNvCxnSpPr>
+          <p:nvPr/>
+        </p:nvCxnSpPr>
+        <p:spPr>
+          <a:xfrm flipH="1">
+            <a:off x="1102711" y="1029717"/>
+            <a:ext cx="655761" cy="1250447"/>
+          </a:xfrm>
+          <a:prstGeom prst="line">
+            <a:avLst/>
+          </a:prstGeom>
+          <a:ln cap="rnd">
+            <a:round/>
+          </a:ln>
+        </p:spPr>
+        <p:style>
+          <a:lnRef idx="2">
+            <a:schemeClr val="dk1"/>
+          </a:lnRef>
+          <a:fillRef idx="0">
+            <a:schemeClr val="dk1"/>
+          </a:fillRef>
+          <a:effectRef idx="1">
+            <a:schemeClr val="dk1"/>
+          </a:effectRef>
+          <a:fontRef idx="minor">
+            <a:schemeClr val="tx1"/>
+          </a:fontRef>
+        </p:style>
+      </p:cxnSp>
+      <p:cxnSp>
+        <p:nvCxnSpPr>
+          <p:cNvPr id="7" name="Gerader Verbinder 6">
+            <a:extLst>
+              <a:ext uri="{FF2B5EF4-FFF2-40B4-BE49-F238E27FC236}">
+                <a16:creationId xmlns:a16="http://schemas.microsoft.com/office/drawing/2014/main" id="{3CA28803-7D69-49C5-4131-67F574D73EC5}"/>
+              </a:ext>
+            </a:extLst>
+          </p:cNvPr>
+          <p:cNvCxnSpPr>
+            <a:cxnSpLocks/>
+          </p:cNvCxnSpPr>
+          <p:nvPr/>
+        </p:nvCxnSpPr>
+        <p:spPr>
+          <a:xfrm flipH="1">
+            <a:off x="1102711" y="2281642"/>
+            <a:ext cx="1803328" cy="0"/>
+          </a:xfrm>
+          <a:prstGeom prst="line">
+            <a:avLst/>
+          </a:prstGeom>
+          <a:ln cap="rnd">
+            <a:round/>
+            <a:headEnd type="stealth" w="lg" len="lg"/>
+          </a:ln>
+        </p:spPr>
+        <p:style>
+          <a:lnRef idx="2">
+            <a:schemeClr val="dk1"/>
+          </a:lnRef>
+          <a:fillRef idx="0">
+            <a:schemeClr val="dk1"/>
+          </a:fillRef>
+          <a:effectRef idx="1">
+            <a:schemeClr val="dk1"/>
+          </a:effectRef>
+          <a:fontRef idx="minor">
+            <a:schemeClr val="tx1"/>
+          </a:fontRef>
+        </p:style>
+      </p:cxnSp>
+      <p:sp>
+        <p:nvSpPr>
+          <p:cNvPr id="11" name="Bogen 10">
+            <a:extLst>
+              <a:ext uri="{FF2B5EF4-FFF2-40B4-BE49-F238E27FC236}">
+                <a16:creationId xmlns:a16="http://schemas.microsoft.com/office/drawing/2014/main" id="{353DCCA2-EAF4-F3A1-164B-6DD68A85A52C}"/>
+              </a:ext>
+            </a:extLst>
+          </p:cNvPr>
+          <p:cNvSpPr/>
+          <p:nvPr/>
+        </p:nvSpPr>
+        <p:spPr>
+          <a:xfrm>
+            <a:off x="669513" y="1849946"/>
+            <a:ext cx="876546" cy="861914"/>
+          </a:xfrm>
+          <a:prstGeom prst="arc">
+            <a:avLst>
+              <a:gd name="adj1" fmla="val 17842812"/>
+              <a:gd name="adj2" fmla="val 21551453"/>
+            </a:avLst>
+          </a:prstGeom>
+          <a:noFill/>
+          <a:ln w="12700" cap="rnd">
+            <a:solidFill>
+              <a:schemeClr val="tx1">
+                <a:lumMod val="65000"/>
+                <a:lumOff val="35000"/>
+              </a:schemeClr>
+            </a:solidFill>
+            <a:round/>
+            <a:headEnd type="stealth" w="med" len="med"/>
+            <a:tailEnd type="stealth" w="med" len="med"/>
+          </a:ln>
+        </p:spPr>
+        <p:style>
+          <a:lnRef idx="2">
+            <a:schemeClr val="dk1"/>
+          </a:lnRef>
+          <a:fillRef idx="0">
+            <a:schemeClr val="dk1"/>
+          </a:fillRef>
+          <a:effectRef idx="1">
+            <a:schemeClr val="dk1"/>
+          </a:effectRef>
+          <a:fontRef idx="minor">
+            <a:schemeClr val="tx1"/>
+          </a:fontRef>
+        </p:style>
+        <p:txBody>
+          <a:bodyPr rtlCol="0" anchor="ctr"/>
+          <a:lstStyle/>
+          <a:p>
+            <a:pPr algn="ctr"/>
+            <a:endParaRPr lang="de-DE"/>
+          </a:p>
+        </p:txBody>
+      </p:sp>
+      <p:cxnSp>
+        <p:nvCxnSpPr>
+          <p:cNvPr id="14" name="Gerader Verbinder 13">
+            <a:extLst>
+              <a:ext uri="{FF2B5EF4-FFF2-40B4-BE49-F238E27FC236}">
+                <a16:creationId xmlns:a16="http://schemas.microsoft.com/office/drawing/2014/main" id="{1944F6FE-5F88-6505-4B9F-2F24F08A76C7}"/>
+              </a:ext>
+            </a:extLst>
+          </p:cNvPr>
+          <p:cNvCxnSpPr>
+            <a:cxnSpLocks/>
+          </p:cNvCxnSpPr>
+          <p:nvPr/>
+        </p:nvCxnSpPr>
+        <p:spPr>
+          <a:xfrm>
+            <a:off x="1197542" y="2280835"/>
+            <a:ext cx="127820" cy="195448"/>
+          </a:xfrm>
+          <a:prstGeom prst="line">
+            <a:avLst/>
+          </a:prstGeom>
+          <a:ln w="12700" cap="rnd">
+            <a:solidFill>
+              <a:schemeClr val="tx1"/>
+            </a:solidFill>
+            <a:round/>
+          </a:ln>
+        </p:spPr>
+        <p:style>
+          <a:lnRef idx="2">
+            <a:schemeClr val="accent1"/>
+          </a:lnRef>
+          <a:fillRef idx="0">
+            <a:schemeClr val="accent1"/>
+          </a:fillRef>
+          <a:effectRef idx="1">
+            <a:schemeClr val="accent1"/>
+          </a:effectRef>
+          <a:fontRef idx="minor">
+            <a:schemeClr val="tx1"/>
+          </a:fontRef>
+        </p:style>
+      </p:cxnSp>
+      <p:cxnSp>
+        <p:nvCxnSpPr>
+          <p:cNvPr id="15" name="Gerader Verbinder 14">
+            <a:extLst>
+              <a:ext uri="{FF2B5EF4-FFF2-40B4-BE49-F238E27FC236}">
+                <a16:creationId xmlns:a16="http://schemas.microsoft.com/office/drawing/2014/main" id="{84958F9E-6EEF-C3DF-1142-1C411B33276A}"/>
+              </a:ext>
+            </a:extLst>
+          </p:cNvPr>
+          <p:cNvCxnSpPr>
+            <a:cxnSpLocks/>
+          </p:cNvCxnSpPr>
+          <p:nvPr/>
+        </p:nvCxnSpPr>
+        <p:spPr>
+          <a:xfrm>
+            <a:off x="1261452" y="2281844"/>
+            <a:ext cx="127820" cy="195448"/>
+          </a:xfrm>
+          <a:prstGeom prst="line">
+            <a:avLst/>
+          </a:prstGeom>
+          <a:ln w="12700" cap="rnd">
+            <a:solidFill>
+              <a:schemeClr val="tx1"/>
+            </a:solidFill>
+            <a:round/>
+          </a:ln>
+        </p:spPr>
+        <p:style>
+          <a:lnRef idx="2">
+            <a:schemeClr val="accent1"/>
+          </a:lnRef>
+          <a:fillRef idx="0">
+            <a:schemeClr val="accent1"/>
+          </a:fillRef>
+          <a:effectRef idx="1">
+            <a:schemeClr val="accent1"/>
+          </a:effectRef>
+          <a:fontRef idx="minor">
+            <a:schemeClr val="tx1"/>
+          </a:fontRef>
+        </p:style>
+      </p:cxnSp>
+      <p:cxnSp>
+        <p:nvCxnSpPr>
+          <p:cNvPr id="16" name="Gerader Verbinder 15">
+            <a:extLst>
+              <a:ext uri="{FF2B5EF4-FFF2-40B4-BE49-F238E27FC236}">
+                <a16:creationId xmlns:a16="http://schemas.microsoft.com/office/drawing/2014/main" id="{345FCB7A-290F-B84D-FE87-3D9BA91732BD}"/>
+              </a:ext>
+            </a:extLst>
+          </p:cNvPr>
+          <p:cNvCxnSpPr>
+            <a:cxnSpLocks/>
+          </p:cNvCxnSpPr>
+          <p:nvPr/>
+        </p:nvCxnSpPr>
+        <p:spPr>
+          <a:xfrm>
+            <a:off x="1325362" y="2280431"/>
+            <a:ext cx="127820" cy="195448"/>
+          </a:xfrm>
+          <a:prstGeom prst="line">
+            <a:avLst/>
+          </a:prstGeom>
+          <a:ln w="12700" cap="rnd">
+            <a:solidFill>
+              <a:schemeClr val="tx1"/>
+            </a:solidFill>
+            <a:round/>
+          </a:ln>
+        </p:spPr>
+        <p:style>
+          <a:lnRef idx="2">
+            <a:schemeClr val="accent1"/>
+          </a:lnRef>
+          <a:fillRef idx="0">
+            <a:schemeClr val="accent1"/>
+          </a:fillRef>
+          <a:effectRef idx="1">
+            <a:schemeClr val="accent1"/>
+          </a:effectRef>
+          <a:fontRef idx="minor">
+            <a:schemeClr val="tx1"/>
+          </a:fontRef>
+        </p:style>
+      </p:cxnSp>
+      <p:cxnSp>
+        <p:nvCxnSpPr>
+          <p:cNvPr id="17" name="Gerader Verbinder 16">
+            <a:extLst>
+              <a:ext uri="{FF2B5EF4-FFF2-40B4-BE49-F238E27FC236}">
+                <a16:creationId xmlns:a16="http://schemas.microsoft.com/office/drawing/2014/main" id="{04EB07F2-97EA-2AD5-4251-048E5A7179BB}"/>
+              </a:ext>
+            </a:extLst>
+          </p:cNvPr>
+          <p:cNvCxnSpPr>
+            <a:cxnSpLocks/>
+          </p:cNvCxnSpPr>
+          <p:nvPr/>
+        </p:nvCxnSpPr>
+        <p:spPr>
+          <a:xfrm>
+            <a:off x="1390979" y="2279511"/>
+            <a:ext cx="127820" cy="195448"/>
+          </a:xfrm>
+          <a:prstGeom prst="line">
+            <a:avLst/>
+          </a:prstGeom>
+          <a:ln w="12700" cap="rnd">
+            <a:solidFill>
+              <a:schemeClr val="tx1"/>
+            </a:solidFill>
+            <a:round/>
+          </a:ln>
+        </p:spPr>
+        <p:style>
+          <a:lnRef idx="2">
+            <a:schemeClr val="accent1"/>
+          </a:lnRef>
+          <a:fillRef idx="0">
+            <a:schemeClr val="accent1"/>
+          </a:fillRef>
+          <a:effectRef idx="1">
+            <a:schemeClr val="accent1"/>
+          </a:effectRef>
+          <a:fontRef idx="minor">
+            <a:schemeClr val="tx1"/>
+          </a:fontRef>
+        </p:style>
+      </p:cxnSp>
+      <p:cxnSp>
+        <p:nvCxnSpPr>
+          <p:cNvPr id="18" name="Gerader Verbinder 17">
+            <a:extLst>
+              <a:ext uri="{FF2B5EF4-FFF2-40B4-BE49-F238E27FC236}">
+                <a16:creationId xmlns:a16="http://schemas.microsoft.com/office/drawing/2014/main" id="{DA94BD58-1502-42C9-25BC-738079F85600}"/>
+              </a:ext>
+            </a:extLst>
+          </p:cNvPr>
+          <p:cNvCxnSpPr>
+            <a:cxnSpLocks/>
+          </p:cNvCxnSpPr>
+          <p:nvPr/>
+        </p:nvCxnSpPr>
+        <p:spPr>
+          <a:xfrm>
+            <a:off x="1454889" y="2281230"/>
+            <a:ext cx="127820" cy="195448"/>
+          </a:xfrm>
+          <a:prstGeom prst="line">
+            <a:avLst/>
+          </a:prstGeom>
+          <a:ln w="12700" cap="rnd">
+            <a:solidFill>
+              <a:schemeClr val="tx1"/>
+            </a:solidFill>
+            <a:round/>
+          </a:ln>
+        </p:spPr>
+        <p:style>
+          <a:lnRef idx="2">
+            <a:schemeClr val="accent1"/>
+          </a:lnRef>
+          <a:fillRef idx="0">
+            <a:schemeClr val="accent1"/>
+          </a:fillRef>
+          <a:effectRef idx="1">
+            <a:schemeClr val="accent1"/>
+          </a:effectRef>
+          <a:fontRef idx="minor">
+            <a:schemeClr val="tx1"/>
+          </a:fontRef>
+        </p:style>
+      </p:cxnSp>
+      <p:cxnSp>
+        <p:nvCxnSpPr>
+          <p:cNvPr id="19" name="Gerader Verbinder 18">
+            <a:extLst>
+              <a:ext uri="{FF2B5EF4-FFF2-40B4-BE49-F238E27FC236}">
+                <a16:creationId xmlns:a16="http://schemas.microsoft.com/office/drawing/2014/main" id="{0C6AF491-D1B6-25D2-F82F-8A83200BE55E}"/>
+              </a:ext>
+            </a:extLst>
+          </p:cNvPr>
+          <p:cNvCxnSpPr>
+            <a:cxnSpLocks/>
+          </p:cNvCxnSpPr>
+          <p:nvPr/>
+        </p:nvCxnSpPr>
+        <p:spPr>
+          <a:xfrm>
+            <a:off x="1518799" y="2279107"/>
+            <a:ext cx="127820" cy="195448"/>
+          </a:xfrm>
+          <a:prstGeom prst="line">
+            <a:avLst/>
+          </a:prstGeom>
+          <a:ln w="12700" cap="rnd">
+            <a:solidFill>
+              <a:schemeClr val="tx1"/>
+            </a:solidFill>
+            <a:round/>
+          </a:ln>
+        </p:spPr>
+        <p:style>
+          <a:lnRef idx="2">
+            <a:schemeClr val="accent1"/>
+          </a:lnRef>
+          <a:fillRef idx="0">
+            <a:schemeClr val="accent1"/>
+          </a:fillRef>
+          <a:effectRef idx="1">
+            <a:schemeClr val="accent1"/>
+          </a:effectRef>
+          <a:fontRef idx="minor">
+            <a:schemeClr val="tx1"/>
+          </a:fontRef>
+        </p:style>
+      </p:cxnSp>
+      <p:cxnSp>
+        <p:nvCxnSpPr>
+          <p:cNvPr id="20" name="Gerader Verbinder 19">
+            <a:extLst>
+              <a:ext uri="{FF2B5EF4-FFF2-40B4-BE49-F238E27FC236}">
+                <a16:creationId xmlns:a16="http://schemas.microsoft.com/office/drawing/2014/main" id="{9386175E-DD22-37EA-F5B1-047947F646F3}"/>
+              </a:ext>
+            </a:extLst>
+          </p:cNvPr>
+          <p:cNvCxnSpPr>
+            <a:cxnSpLocks/>
+          </p:cNvCxnSpPr>
+          <p:nvPr/>
+        </p:nvCxnSpPr>
+        <p:spPr>
+          <a:xfrm>
+            <a:off x="1582709" y="2280826"/>
+            <a:ext cx="127820" cy="195448"/>
+          </a:xfrm>
+          <a:prstGeom prst="line">
+            <a:avLst/>
+          </a:prstGeom>
+          <a:ln w="12700" cap="rnd">
+            <a:solidFill>
+              <a:schemeClr val="tx1"/>
+            </a:solidFill>
+            <a:round/>
+          </a:ln>
+        </p:spPr>
+        <p:style>
+          <a:lnRef idx="2">
+            <a:schemeClr val="accent1"/>
+          </a:lnRef>
+          <a:fillRef idx="0">
+            <a:schemeClr val="accent1"/>
+          </a:fillRef>
+          <a:effectRef idx="1">
+            <a:schemeClr val="accent1"/>
+          </a:effectRef>
+          <a:fontRef idx="minor">
+            <a:schemeClr val="tx1"/>
+          </a:fontRef>
+        </p:style>
+      </p:cxnSp>
+      <p:cxnSp>
+        <p:nvCxnSpPr>
+          <p:cNvPr id="21" name="Gerader Verbinder 20">
+            <a:extLst>
+              <a:ext uri="{FF2B5EF4-FFF2-40B4-BE49-F238E27FC236}">
+                <a16:creationId xmlns:a16="http://schemas.microsoft.com/office/drawing/2014/main" id="{E109B9D9-D053-6AC2-4537-A098D19F1065}"/>
+              </a:ext>
+            </a:extLst>
+          </p:cNvPr>
+          <p:cNvCxnSpPr>
+            <a:cxnSpLocks/>
+          </p:cNvCxnSpPr>
+          <p:nvPr/>
+        </p:nvCxnSpPr>
+        <p:spPr>
+          <a:xfrm>
+            <a:off x="1647041" y="2281504"/>
+            <a:ext cx="127820" cy="195448"/>
+          </a:xfrm>
+          <a:prstGeom prst="line">
+            <a:avLst/>
+          </a:prstGeom>
+          <a:ln w="12700" cap="rnd">
+            <a:solidFill>
+              <a:schemeClr val="tx1"/>
+            </a:solidFill>
+            <a:round/>
+          </a:ln>
+        </p:spPr>
+        <p:style>
+          <a:lnRef idx="2">
+            <a:schemeClr val="accent1"/>
+          </a:lnRef>
+          <a:fillRef idx="0">
+            <a:schemeClr val="accent1"/>
+          </a:fillRef>
+          <a:effectRef idx="1">
+            <a:schemeClr val="accent1"/>
+          </a:effectRef>
+          <a:fontRef idx="minor">
+            <a:schemeClr val="tx1"/>
+          </a:fontRef>
+        </p:style>
+      </p:cxnSp>
+      <p:cxnSp>
+        <p:nvCxnSpPr>
+          <p:cNvPr id="22" name="Gerader Verbinder 21">
+            <a:extLst>
+              <a:ext uri="{FF2B5EF4-FFF2-40B4-BE49-F238E27FC236}">
+                <a16:creationId xmlns:a16="http://schemas.microsoft.com/office/drawing/2014/main" id="{7A32A71E-1B8B-DC5C-E4F8-73A830C867A6}"/>
+              </a:ext>
+            </a:extLst>
+          </p:cNvPr>
+          <p:cNvCxnSpPr>
+            <a:cxnSpLocks/>
+          </p:cNvCxnSpPr>
+          <p:nvPr/>
+        </p:nvCxnSpPr>
+        <p:spPr>
+          <a:xfrm>
+            <a:off x="1710951" y="2280091"/>
+            <a:ext cx="127820" cy="195448"/>
+          </a:xfrm>
+          <a:prstGeom prst="line">
+            <a:avLst/>
+          </a:prstGeom>
+          <a:ln w="12700" cap="rnd">
+            <a:solidFill>
+              <a:schemeClr val="tx1"/>
+            </a:solidFill>
+            <a:round/>
+          </a:ln>
+        </p:spPr>
+        <p:style>
+          <a:lnRef idx="2">
+            <a:schemeClr val="accent1"/>
+          </a:lnRef>
+          <a:fillRef idx="0">
+            <a:schemeClr val="accent1"/>
+          </a:fillRef>
+          <a:effectRef idx="1">
+            <a:schemeClr val="accent1"/>
+          </a:effectRef>
+          <a:fontRef idx="minor">
+            <a:schemeClr val="tx1"/>
+          </a:fontRef>
+        </p:style>
+      </p:cxnSp>
+      <p:cxnSp>
+        <p:nvCxnSpPr>
+          <p:cNvPr id="23" name="Gerader Verbinder 22">
+            <a:extLst>
+              <a:ext uri="{FF2B5EF4-FFF2-40B4-BE49-F238E27FC236}">
+                <a16:creationId xmlns:a16="http://schemas.microsoft.com/office/drawing/2014/main" id="{E5EBE5CC-63BD-120A-4744-68928B25133D}"/>
+              </a:ext>
+            </a:extLst>
+          </p:cNvPr>
+          <p:cNvCxnSpPr>
+            <a:cxnSpLocks/>
+          </p:cNvCxnSpPr>
+          <p:nvPr/>
+        </p:nvCxnSpPr>
+        <p:spPr>
+          <a:xfrm>
+            <a:off x="1774861" y="2281100"/>
+            <a:ext cx="127820" cy="195448"/>
+          </a:xfrm>
+          <a:prstGeom prst="line">
+            <a:avLst/>
+          </a:prstGeom>
+          <a:ln w="12700" cap="rnd">
+            <a:solidFill>
+              <a:schemeClr val="tx1"/>
+            </a:solidFill>
+            <a:round/>
+          </a:ln>
+        </p:spPr>
+        <p:style>
+          <a:lnRef idx="2">
+            <a:schemeClr val="accent1"/>
+          </a:lnRef>
+          <a:fillRef idx="0">
+            <a:schemeClr val="accent1"/>
+          </a:fillRef>
+          <a:effectRef idx="1">
+            <a:schemeClr val="accent1"/>
+          </a:effectRef>
+          <a:fontRef idx="minor">
+            <a:schemeClr val="tx1"/>
+          </a:fontRef>
+        </p:style>
+      </p:cxnSp>
+      <p:cxnSp>
+        <p:nvCxnSpPr>
+          <p:cNvPr id="24" name="Gerader Verbinder 23">
+            <a:extLst>
+              <a:ext uri="{FF2B5EF4-FFF2-40B4-BE49-F238E27FC236}">
+                <a16:creationId xmlns:a16="http://schemas.microsoft.com/office/drawing/2014/main" id="{B7EBB11C-1CCE-1DC8-59FF-804CB4653D4E}"/>
+              </a:ext>
+            </a:extLst>
+          </p:cNvPr>
+          <p:cNvCxnSpPr>
+            <a:cxnSpLocks/>
+          </p:cNvCxnSpPr>
+          <p:nvPr/>
+        </p:nvCxnSpPr>
+        <p:spPr>
+          <a:xfrm>
+            <a:off x="1838771" y="2279687"/>
+            <a:ext cx="127820" cy="195448"/>
+          </a:xfrm>
+          <a:prstGeom prst="line">
+            <a:avLst/>
+          </a:prstGeom>
+          <a:ln w="12700" cap="rnd">
+            <a:solidFill>
+              <a:schemeClr val="tx1"/>
+            </a:solidFill>
+            <a:round/>
+          </a:ln>
+        </p:spPr>
+        <p:style>
+          <a:lnRef idx="2">
+            <a:schemeClr val="accent1"/>
+          </a:lnRef>
+          <a:fillRef idx="0">
+            <a:schemeClr val="accent1"/>
+          </a:fillRef>
+          <a:effectRef idx="1">
+            <a:schemeClr val="accent1"/>
+          </a:effectRef>
+          <a:fontRef idx="minor">
+            <a:schemeClr val="tx1"/>
+          </a:fontRef>
+        </p:style>
+      </p:cxnSp>
+      <p:cxnSp>
+        <p:nvCxnSpPr>
+          <p:cNvPr id="25" name="Gerader Verbinder 24">
+            <a:extLst>
+              <a:ext uri="{FF2B5EF4-FFF2-40B4-BE49-F238E27FC236}">
+                <a16:creationId xmlns:a16="http://schemas.microsoft.com/office/drawing/2014/main" id="{C8D6B262-6FC2-F747-880F-C024301B1265}"/>
+              </a:ext>
+            </a:extLst>
+          </p:cNvPr>
+          <p:cNvCxnSpPr>
+            <a:cxnSpLocks/>
+          </p:cNvCxnSpPr>
+          <p:nvPr/>
+        </p:nvCxnSpPr>
+        <p:spPr>
+          <a:xfrm>
+            <a:off x="1903988" y="2282248"/>
+            <a:ext cx="127820" cy="195448"/>
+          </a:xfrm>
+          <a:prstGeom prst="line">
+            <a:avLst/>
+          </a:prstGeom>
+          <a:ln w="12700" cap="rnd">
+            <a:solidFill>
+              <a:schemeClr val="tx1"/>
+            </a:solidFill>
+            <a:round/>
+          </a:ln>
+        </p:spPr>
+        <p:style>
+          <a:lnRef idx="2">
+            <a:schemeClr val="accent1"/>
+          </a:lnRef>
+          <a:fillRef idx="0">
+            <a:schemeClr val="accent1"/>
+          </a:fillRef>
+          <a:effectRef idx="1">
+            <a:schemeClr val="accent1"/>
+          </a:effectRef>
+          <a:fontRef idx="minor">
+            <a:schemeClr val="tx1"/>
+          </a:fontRef>
+        </p:style>
+      </p:cxnSp>
+      <p:cxnSp>
+        <p:nvCxnSpPr>
+          <p:cNvPr id="26" name="Gerader Verbinder 25">
+            <a:extLst>
+              <a:ext uri="{FF2B5EF4-FFF2-40B4-BE49-F238E27FC236}">
+                <a16:creationId xmlns:a16="http://schemas.microsoft.com/office/drawing/2014/main" id="{669D9F79-5475-6756-E4D6-4358B24922E8}"/>
+              </a:ext>
+            </a:extLst>
+          </p:cNvPr>
+          <p:cNvCxnSpPr>
+            <a:cxnSpLocks/>
+          </p:cNvCxnSpPr>
+          <p:nvPr/>
+        </p:nvCxnSpPr>
+        <p:spPr>
+          <a:xfrm>
+            <a:off x="1967898" y="2280835"/>
+            <a:ext cx="127820" cy="195448"/>
+          </a:xfrm>
+          <a:prstGeom prst="line">
+            <a:avLst/>
+          </a:prstGeom>
+          <a:ln w="12700" cap="rnd">
+            <a:solidFill>
+              <a:schemeClr val="tx1"/>
+            </a:solidFill>
+            <a:round/>
+          </a:ln>
+        </p:spPr>
+        <p:style>
+          <a:lnRef idx="2">
+            <a:schemeClr val="accent1"/>
+          </a:lnRef>
+          <a:fillRef idx="0">
+            <a:schemeClr val="accent1"/>
+          </a:fillRef>
+          <a:effectRef idx="1">
+            <a:schemeClr val="accent1"/>
+          </a:effectRef>
+          <a:fontRef idx="minor">
+            <a:schemeClr val="tx1"/>
+          </a:fontRef>
+        </p:style>
+      </p:cxnSp>
+      <p:cxnSp>
+        <p:nvCxnSpPr>
+          <p:cNvPr id="27" name="Gerader Verbinder 26">
+            <a:extLst>
+              <a:ext uri="{FF2B5EF4-FFF2-40B4-BE49-F238E27FC236}">
+                <a16:creationId xmlns:a16="http://schemas.microsoft.com/office/drawing/2014/main" id="{F5E3C8A6-A1C1-C783-2A4B-30FAF2B83268}"/>
+              </a:ext>
+            </a:extLst>
+          </p:cNvPr>
+          <p:cNvCxnSpPr>
+            <a:cxnSpLocks/>
+          </p:cNvCxnSpPr>
+          <p:nvPr/>
+        </p:nvCxnSpPr>
+        <p:spPr>
+          <a:xfrm>
+            <a:off x="2031808" y="2281844"/>
+            <a:ext cx="127820" cy="195448"/>
+          </a:xfrm>
+          <a:prstGeom prst="line">
+            <a:avLst/>
+          </a:prstGeom>
+          <a:ln w="12700" cap="rnd">
+            <a:solidFill>
+              <a:schemeClr val="tx1"/>
+            </a:solidFill>
+            <a:round/>
+          </a:ln>
+        </p:spPr>
+        <p:style>
+          <a:lnRef idx="2">
+            <a:schemeClr val="accent1"/>
+          </a:lnRef>
+          <a:fillRef idx="0">
+            <a:schemeClr val="accent1"/>
+          </a:fillRef>
+          <a:effectRef idx="1">
+            <a:schemeClr val="accent1"/>
+          </a:effectRef>
+          <a:fontRef idx="minor">
+            <a:schemeClr val="tx1"/>
+          </a:fontRef>
+        </p:style>
+      </p:cxnSp>
+      <p:cxnSp>
+        <p:nvCxnSpPr>
+          <p:cNvPr id="28" name="Gerader Verbinder 27">
+            <a:extLst>
+              <a:ext uri="{FF2B5EF4-FFF2-40B4-BE49-F238E27FC236}">
+                <a16:creationId xmlns:a16="http://schemas.microsoft.com/office/drawing/2014/main" id="{D8C1FE2B-552E-A6F6-6845-E28C6DE1D0CF}"/>
+              </a:ext>
+            </a:extLst>
+          </p:cNvPr>
+          <p:cNvCxnSpPr>
+            <a:cxnSpLocks/>
+          </p:cNvCxnSpPr>
+          <p:nvPr/>
+        </p:nvCxnSpPr>
+        <p:spPr>
+          <a:xfrm>
+            <a:off x="2095718" y="2280431"/>
+            <a:ext cx="127820" cy="195448"/>
+          </a:xfrm>
+          <a:prstGeom prst="line">
+            <a:avLst/>
+          </a:prstGeom>
+          <a:ln w="12700" cap="rnd">
+            <a:solidFill>
+              <a:schemeClr val="tx1"/>
+            </a:solidFill>
+            <a:round/>
+          </a:ln>
+        </p:spPr>
+        <p:style>
+          <a:lnRef idx="2">
+            <a:schemeClr val="accent1"/>
+          </a:lnRef>
+          <a:fillRef idx="0">
+            <a:schemeClr val="accent1"/>
+          </a:fillRef>
+          <a:effectRef idx="1">
+            <a:schemeClr val="accent1"/>
+          </a:effectRef>
+          <a:fontRef idx="minor">
+            <a:schemeClr val="tx1"/>
+          </a:fontRef>
+        </p:style>
+      </p:cxnSp>
+      <p:cxnSp>
+        <p:nvCxnSpPr>
+          <p:cNvPr id="29" name="Gerader Verbinder 28">
+            <a:extLst>
+              <a:ext uri="{FF2B5EF4-FFF2-40B4-BE49-F238E27FC236}">
+                <a16:creationId xmlns:a16="http://schemas.microsoft.com/office/drawing/2014/main" id="{B4866CDB-B46C-6DAE-BA52-F9DB4CA3D611}"/>
+              </a:ext>
+            </a:extLst>
+          </p:cNvPr>
+          <p:cNvCxnSpPr>
+            <a:cxnSpLocks/>
+          </p:cNvCxnSpPr>
+          <p:nvPr/>
+        </p:nvCxnSpPr>
+        <p:spPr>
+          <a:xfrm>
+            <a:off x="2159628" y="2281542"/>
+            <a:ext cx="127820" cy="195448"/>
+          </a:xfrm>
+          <a:prstGeom prst="line">
+            <a:avLst/>
+          </a:prstGeom>
+          <a:ln w="12700" cap="rnd">
+            <a:solidFill>
+              <a:schemeClr val="tx1"/>
+            </a:solidFill>
+            <a:round/>
+          </a:ln>
+        </p:spPr>
+        <p:style>
+          <a:lnRef idx="2">
+            <a:schemeClr val="accent1"/>
+          </a:lnRef>
+          <a:fillRef idx="0">
+            <a:schemeClr val="accent1"/>
+          </a:fillRef>
+          <a:effectRef idx="1">
+            <a:schemeClr val="accent1"/>
+          </a:effectRef>
+          <a:fontRef idx="minor">
+            <a:schemeClr val="tx1"/>
+          </a:fontRef>
+        </p:style>
+      </p:cxnSp>
+      <p:cxnSp>
+        <p:nvCxnSpPr>
+          <p:cNvPr id="30" name="Gerader Verbinder 29">
+            <a:extLst>
+              <a:ext uri="{FF2B5EF4-FFF2-40B4-BE49-F238E27FC236}">
+                <a16:creationId xmlns:a16="http://schemas.microsoft.com/office/drawing/2014/main" id="{2BA26B25-E09B-56FB-80E5-42D17C71F69B}"/>
+              </a:ext>
+            </a:extLst>
+          </p:cNvPr>
+          <p:cNvCxnSpPr>
+            <a:cxnSpLocks/>
+          </p:cNvCxnSpPr>
+          <p:nvPr/>
+        </p:nvCxnSpPr>
+        <p:spPr>
+          <a:xfrm>
+            <a:off x="2223538" y="2280129"/>
+            <a:ext cx="127820" cy="195448"/>
+          </a:xfrm>
+          <a:prstGeom prst="line">
+            <a:avLst/>
+          </a:prstGeom>
+          <a:ln w="12700" cap="rnd">
+            <a:solidFill>
+              <a:schemeClr val="tx1"/>
+            </a:solidFill>
+            <a:round/>
+          </a:ln>
+        </p:spPr>
+        <p:style>
+          <a:lnRef idx="2">
+            <a:schemeClr val="accent1"/>
+          </a:lnRef>
+          <a:fillRef idx="0">
+            <a:schemeClr val="accent1"/>
+          </a:fillRef>
+          <a:effectRef idx="1">
+            <a:schemeClr val="accent1"/>
+          </a:effectRef>
+          <a:fontRef idx="minor">
+            <a:schemeClr val="tx1"/>
+          </a:fontRef>
+        </p:style>
+      </p:cxnSp>
+      <p:cxnSp>
+        <p:nvCxnSpPr>
+          <p:cNvPr id="31" name="Gerader Verbinder 30">
+            <a:extLst>
+              <a:ext uri="{FF2B5EF4-FFF2-40B4-BE49-F238E27FC236}">
+                <a16:creationId xmlns:a16="http://schemas.microsoft.com/office/drawing/2014/main" id="{EC88E4D0-F749-085E-85C1-C65A4685EE1B}"/>
+              </a:ext>
+            </a:extLst>
+          </p:cNvPr>
+          <p:cNvCxnSpPr>
+            <a:cxnSpLocks/>
+          </p:cNvCxnSpPr>
+          <p:nvPr/>
+        </p:nvCxnSpPr>
+        <p:spPr>
+          <a:xfrm>
+            <a:off x="2287448" y="2281138"/>
+            <a:ext cx="127820" cy="195448"/>
+          </a:xfrm>
+          <a:prstGeom prst="line">
+            <a:avLst/>
+          </a:prstGeom>
+          <a:ln w="12700" cap="rnd">
+            <a:solidFill>
+              <a:schemeClr val="tx1"/>
+            </a:solidFill>
+            <a:round/>
+          </a:ln>
+        </p:spPr>
+        <p:style>
+          <a:lnRef idx="2">
+            <a:schemeClr val="accent1"/>
+          </a:lnRef>
+          <a:fillRef idx="0">
+            <a:schemeClr val="accent1"/>
+          </a:fillRef>
+          <a:effectRef idx="1">
+            <a:schemeClr val="accent1"/>
+          </a:effectRef>
+          <a:fontRef idx="minor">
+            <a:schemeClr val="tx1"/>
+          </a:fontRef>
+        </p:style>
+      </p:cxnSp>
+      <p:cxnSp>
+        <p:nvCxnSpPr>
+          <p:cNvPr id="32" name="Gerader Verbinder 31">
+            <a:extLst>
+              <a:ext uri="{FF2B5EF4-FFF2-40B4-BE49-F238E27FC236}">
+                <a16:creationId xmlns:a16="http://schemas.microsoft.com/office/drawing/2014/main" id="{D080EB0C-C238-E2EE-FAD2-36AC3C0EAA05}"/>
+              </a:ext>
+            </a:extLst>
+          </p:cNvPr>
+          <p:cNvCxnSpPr>
+            <a:cxnSpLocks/>
+          </p:cNvCxnSpPr>
+          <p:nvPr/>
+        </p:nvCxnSpPr>
+        <p:spPr>
+          <a:xfrm>
+            <a:off x="2351358" y="2279725"/>
+            <a:ext cx="127820" cy="195448"/>
+          </a:xfrm>
+          <a:prstGeom prst="line">
+            <a:avLst/>
+          </a:prstGeom>
+          <a:ln w="12700" cap="rnd">
+            <a:solidFill>
+              <a:schemeClr val="tx1"/>
+            </a:solidFill>
+            <a:round/>
+          </a:ln>
+        </p:spPr>
+        <p:style>
+          <a:lnRef idx="2">
+            <a:schemeClr val="accent1"/>
+          </a:lnRef>
+          <a:fillRef idx="0">
+            <a:schemeClr val="accent1"/>
+          </a:fillRef>
+          <a:effectRef idx="1">
+            <a:schemeClr val="accent1"/>
+          </a:effectRef>
+          <a:fontRef idx="minor">
+            <a:schemeClr val="tx1"/>
+          </a:fontRef>
+        </p:style>
+      </p:cxnSp>
+      <p:cxnSp>
+        <p:nvCxnSpPr>
+          <p:cNvPr id="33" name="Gerader Verbinder 32">
+            <a:extLst>
+              <a:ext uri="{FF2B5EF4-FFF2-40B4-BE49-F238E27FC236}">
+                <a16:creationId xmlns:a16="http://schemas.microsoft.com/office/drawing/2014/main" id="{C2DFB181-4D24-B0F2-CDDF-741E3DA171CD}"/>
+              </a:ext>
+            </a:extLst>
+          </p:cNvPr>
+          <p:cNvCxnSpPr>
+            <a:cxnSpLocks/>
+          </p:cNvCxnSpPr>
+          <p:nvPr/>
+        </p:nvCxnSpPr>
+        <p:spPr>
+          <a:xfrm>
+            <a:off x="2415268" y="2279511"/>
+            <a:ext cx="127820" cy="195448"/>
+          </a:xfrm>
+          <a:prstGeom prst="line">
+            <a:avLst/>
+          </a:prstGeom>
+          <a:ln w="12700" cap="rnd">
+            <a:solidFill>
+              <a:schemeClr val="tx1"/>
+            </a:solidFill>
+            <a:round/>
+          </a:ln>
+        </p:spPr>
+        <p:style>
+          <a:lnRef idx="2">
+            <a:schemeClr val="accent1"/>
+          </a:lnRef>
+          <a:fillRef idx="0">
+            <a:schemeClr val="accent1"/>
+          </a:fillRef>
+          <a:effectRef idx="1">
+            <a:schemeClr val="accent1"/>
+          </a:effectRef>
+          <a:fontRef idx="minor">
+            <a:schemeClr val="tx1"/>
+          </a:fontRef>
+        </p:style>
+      </p:cxnSp>
+      <p:cxnSp>
+        <p:nvCxnSpPr>
+          <p:cNvPr id="37" name="Gerader Verbinder 36">
+            <a:extLst>
+              <a:ext uri="{FF2B5EF4-FFF2-40B4-BE49-F238E27FC236}">
+                <a16:creationId xmlns:a16="http://schemas.microsoft.com/office/drawing/2014/main" id="{26818B5B-BA27-A418-E06F-079152E0A8CF}"/>
+              </a:ext>
+            </a:extLst>
+          </p:cNvPr>
+          <p:cNvCxnSpPr>
+            <a:cxnSpLocks/>
+          </p:cNvCxnSpPr>
+          <p:nvPr/>
+        </p:nvCxnSpPr>
+        <p:spPr>
+          <a:xfrm>
+            <a:off x="2479178" y="2281230"/>
+            <a:ext cx="127820" cy="195448"/>
+          </a:xfrm>
+          <a:prstGeom prst="line">
+            <a:avLst/>
+          </a:prstGeom>
+          <a:ln w="12700" cap="rnd">
+            <a:solidFill>
+              <a:schemeClr val="tx1"/>
+            </a:solidFill>
+            <a:round/>
+          </a:ln>
+        </p:spPr>
+        <p:style>
+          <a:lnRef idx="2">
+            <a:schemeClr val="accent1"/>
+          </a:lnRef>
+          <a:fillRef idx="0">
+            <a:schemeClr val="accent1"/>
+          </a:fillRef>
+          <a:effectRef idx="1">
+            <a:schemeClr val="accent1"/>
+          </a:effectRef>
+          <a:fontRef idx="minor">
+            <a:schemeClr val="tx1"/>
+          </a:fontRef>
+        </p:style>
+      </p:cxnSp>
+      <p:cxnSp>
+        <p:nvCxnSpPr>
+          <p:cNvPr id="38" name="Gerader Verbinder 37">
+            <a:extLst>
+              <a:ext uri="{FF2B5EF4-FFF2-40B4-BE49-F238E27FC236}">
+                <a16:creationId xmlns:a16="http://schemas.microsoft.com/office/drawing/2014/main" id="{2B137F74-F0EB-6AA4-3D28-A250FD348284}"/>
+              </a:ext>
+            </a:extLst>
+          </p:cNvPr>
+          <p:cNvCxnSpPr>
+            <a:cxnSpLocks/>
+          </p:cNvCxnSpPr>
+          <p:nvPr/>
+        </p:nvCxnSpPr>
+        <p:spPr>
+          <a:xfrm>
+            <a:off x="2543088" y="2279107"/>
+            <a:ext cx="127820" cy="195448"/>
+          </a:xfrm>
+          <a:prstGeom prst="line">
+            <a:avLst/>
+          </a:prstGeom>
+          <a:ln w="12700" cap="rnd">
+            <a:solidFill>
+              <a:schemeClr val="tx1"/>
+            </a:solidFill>
+            <a:round/>
+          </a:ln>
+        </p:spPr>
+        <p:style>
+          <a:lnRef idx="2">
+            <a:schemeClr val="accent1"/>
+          </a:lnRef>
+          <a:fillRef idx="0">
+            <a:schemeClr val="accent1"/>
+          </a:fillRef>
+          <a:effectRef idx="1">
+            <a:schemeClr val="accent1"/>
+          </a:effectRef>
+          <a:fontRef idx="minor">
+            <a:schemeClr val="tx1"/>
+          </a:fontRef>
+        </p:style>
+      </p:cxnSp>
+      <p:cxnSp>
+        <p:nvCxnSpPr>
+          <p:cNvPr id="57" name="Gerader Verbinder 56">
+            <a:extLst>
+              <a:ext uri="{FF2B5EF4-FFF2-40B4-BE49-F238E27FC236}">
+                <a16:creationId xmlns:a16="http://schemas.microsoft.com/office/drawing/2014/main" id="{EEECA183-4DD5-6C0F-2BA4-19E19B4365B4}"/>
+              </a:ext>
+            </a:extLst>
+          </p:cNvPr>
+          <p:cNvCxnSpPr>
+            <a:cxnSpLocks/>
+          </p:cNvCxnSpPr>
+          <p:nvPr/>
+        </p:nvCxnSpPr>
+        <p:spPr>
+          <a:xfrm>
+            <a:off x="2606998" y="2280826"/>
+            <a:ext cx="127820" cy="195448"/>
+          </a:xfrm>
+          <a:prstGeom prst="line">
+            <a:avLst/>
+          </a:prstGeom>
+          <a:ln w="12700" cap="rnd">
+            <a:solidFill>
+              <a:schemeClr val="tx1"/>
+            </a:solidFill>
+            <a:round/>
+          </a:ln>
+        </p:spPr>
+        <p:style>
+          <a:lnRef idx="2">
+            <a:schemeClr val="accent1"/>
+          </a:lnRef>
+          <a:fillRef idx="0">
+            <a:schemeClr val="accent1"/>
+          </a:fillRef>
+          <a:effectRef idx="1">
+            <a:schemeClr val="accent1"/>
+          </a:effectRef>
+          <a:fontRef idx="minor">
+            <a:schemeClr val="tx1"/>
+          </a:fontRef>
+        </p:style>
+      </p:cxnSp>
+      <p:cxnSp>
+        <p:nvCxnSpPr>
+          <p:cNvPr id="58" name="Gerader Verbinder 57">
+            <a:extLst>
+              <a:ext uri="{FF2B5EF4-FFF2-40B4-BE49-F238E27FC236}">
+                <a16:creationId xmlns:a16="http://schemas.microsoft.com/office/drawing/2014/main" id="{99D03819-1D77-95C9-0420-279C4B17583A}"/>
+              </a:ext>
+            </a:extLst>
+          </p:cNvPr>
+          <p:cNvCxnSpPr>
+            <a:cxnSpLocks/>
+          </p:cNvCxnSpPr>
+          <p:nvPr/>
+        </p:nvCxnSpPr>
+        <p:spPr>
+          <a:xfrm>
+            <a:off x="1196584" y="1656315"/>
+            <a:ext cx="127820" cy="195448"/>
+          </a:xfrm>
+          <a:prstGeom prst="line">
+            <a:avLst/>
+          </a:prstGeom>
+          <a:ln w="12700" cap="rnd">
+            <a:solidFill>
+              <a:schemeClr val="tx1"/>
+            </a:solidFill>
+            <a:round/>
+          </a:ln>
+        </p:spPr>
+        <p:style>
+          <a:lnRef idx="2">
+            <a:schemeClr val="accent1"/>
+          </a:lnRef>
+          <a:fillRef idx="0">
+            <a:schemeClr val="accent1"/>
+          </a:fillRef>
+          <a:effectRef idx="1">
+            <a:schemeClr val="accent1"/>
+          </a:effectRef>
+          <a:fontRef idx="minor">
+            <a:schemeClr val="tx1"/>
+          </a:fontRef>
+        </p:style>
+      </p:cxnSp>
+      <p:cxnSp>
+        <p:nvCxnSpPr>
+          <p:cNvPr id="59" name="Gerader Verbinder 58">
+            <a:extLst>
+              <a:ext uri="{FF2B5EF4-FFF2-40B4-BE49-F238E27FC236}">
+                <a16:creationId xmlns:a16="http://schemas.microsoft.com/office/drawing/2014/main" id="{A23E2C8B-1826-F69C-50EC-8172C0DF4B91}"/>
+              </a:ext>
+            </a:extLst>
+          </p:cNvPr>
+          <p:cNvCxnSpPr>
+            <a:cxnSpLocks/>
+          </p:cNvCxnSpPr>
+          <p:nvPr/>
+        </p:nvCxnSpPr>
+        <p:spPr>
+          <a:xfrm>
+            <a:off x="1225260" y="1603467"/>
+            <a:ext cx="127820" cy="195448"/>
+          </a:xfrm>
+          <a:prstGeom prst="line">
+            <a:avLst/>
+          </a:prstGeom>
+          <a:ln w="12700" cap="rnd">
+            <a:solidFill>
+              <a:schemeClr val="tx1"/>
+            </a:solidFill>
+            <a:round/>
+          </a:ln>
+        </p:spPr>
+        <p:style>
+          <a:lnRef idx="2">
+            <a:schemeClr val="accent1"/>
+          </a:lnRef>
+          <a:fillRef idx="0">
+            <a:schemeClr val="accent1"/>
+          </a:fillRef>
+          <a:effectRef idx="1">
+            <a:schemeClr val="accent1"/>
+          </a:effectRef>
+          <a:fontRef idx="minor">
+            <a:schemeClr val="tx1"/>
+          </a:fontRef>
+        </p:style>
+      </p:cxnSp>
+      <p:cxnSp>
+        <p:nvCxnSpPr>
+          <p:cNvPr id="60" name="Gerader Verbinder 59">
+            <a:extLst>
+              <a:ext uri="{FF2B5EF4-FFF2-40B4-BE49-F238E27FC236}">
+                <a16:creationId xmlns:a16="http://schemas.microsoft.com/office/drawing/2014/main" id="{79EBC6B8-BDBD-6B8E-E254-A7CC38B977BD}"/>
+              </a:ext>
+            </a:extLst>
+          </p:cNvPr>
+          <p:cNvCxnSpPr>
+            <a:cxnSpLocks/>
+          </p:cNvCxnSpPr>
+          <p:nvPr/>
+        </p:nvCxnSpPr>
+        <p:spPr>
+          <a:xfrm>
+            <a:off x="1253843" y="1551764"/>
+            <a:ext cx="127820" cy="195448"/>
+          </a:xfrm>
+          <a:prstGeom prst="line">
+            <a:avLst/>
+          </a:prstGeom>
+          <a:ln w="12700" cap="rnd">
+            <a:solidFill>
+              <a:schemeClr val="tx1"/>
+            </a:solidFill>
+            <a:round/>
+          </a:ln>
+        </p:spPr>
+        <p:style>
+          <a:lnRef idx="2">
+            <a:schemeClr val="accent1"/>
+          </a:lnRef>
+          <a:fillRef idx="0">
+            <a:schemeClr val="accent1"/>
+          </a:fillRef>
+          <a:effectRef idx="1">
+            <a:schemeClr val="accent1"/>
+          </a:effectRef>
+          <a:fontRef idx="minor">
+            <a:schemeClr val="tx1"/>
+          </a:fontRef>
+        </p:style>
+      </p:cxnSp>
+      <p:cxnSp>
+        <p:nvCxnSpPr>
+          <p:cNvPr id="61" name="Gerader Verbinder 60">
+            <a:extLst>
+              <a:ext uri="{FF2B5EF4-FFF2-40B4-BE49-F238E27FC236}">
+                <a16:creationId xmlns:a16="http://schemas.microsoft.com/office/drawing/2014/main" id="{42D29C0A-219E-F318-C70B-265CB8B37434}"/>
+              </a:ext>
+            </a:extLst>
+          </p:cNvPr>
+          <p:cNvCxnSpPr>
+            <a:cxnSpLocks/>
+          </p:cNvCxnSpPr>
+          <p:nvPr/>
+        </p:nvCxnSpPr>
+        <p:spPr>
+          <a:xfrm>
+            <a:off x="1282426" y="1500061"/>
+            <a:ext cx="127820" cy="195448"/>
+          </a:xfrm>
+          <a:prstGeom prst="line">
+            <a:avLst/>
+          </a:prstGeom>
+          <a:ln w="12700" cap="rnd">
+            <a:solidFill>
+              <a:schemeClr val="tx1"/>
+            </a:solidFill>
+            <a:round/>
+          </a:ln>
+        </p:spPr>
+        <p:style>
+          <a:lnRef idx="2">
+            <a:schemeClr val="accent1"/>
+          </a:lnRef>
+          <a:fillRef idx="0">
+            <a:schemeClr val="accent1"/>
+          </a:fillRef>
+          <a:effectRef idx="1">
+            <a:schemeClr val="accent1"/>
+          </a:effectRef>
+          <a:fontRef idx="minor">
+            <a:schemeClr val="tx1"/>
+          </a:fontRef>
+        </p:style>
+      </p:cxnSp>
+      <p:cxnSp>
+        <p:nvCxnSpPr>
+          <p:cNvPr id="69" name="Gerader Verbinder 68">
+            <a:extLst>
+              <a:ext uri="{FF2B5EF4-FFF2-40B4-BE49-F238E27FC236}">
+                <a16:creationId xmlns:a16="http://schemas.microsoft.com/office/drawing/2014/main" id="{D01692FF-1BAD-799A-A58F-AF8C1B3832D3}"/>
+              </a:ext>
+            </a:extLst>
+          </p:cNvPr>
+          <p:cNvCxnSpPr>
+            <a:cxnSpLocks/>
+          </p:cNvCxnSpPr>
+          <p:nvPr/>
+        </p:nvCxnSpPr>
+        <p:spPr>
+          <a:xfrm>
+            <a:off x="1037374" y="2233783"/>
+            <a:ext cx="159515" cy="243913"/>
+          </a:xfrm>
+          <a:prstGeom prst="line">
+            <a:avLst/>
+          </a:prstGeom>
+          <a:ln w="12700" cap="rnd">
+            <a:solidFill>
+              <a:schemeClr val="tx1"/>
+            </a:solidFill>
+            <a:round/>
+          </a:ln>
+        </p:spPr>
+        <p:style>
+          <a:lnRef idx="2">
+            <a:schemeClr val="accent1"/>
+          </a:lnRef>
+          <a:fillRef idx="0">
+            <a:schemeClr val="accent1"/>
+          </a:fillRef>
+          <a:effectRef idx="1">
+            <a:schemeClr val="accent1"/>
+          </a:effectRef>
+          <a:fontRef idx="minor">
+            <a:schemeClr val="tx1"/>
+          </a:fontRef>
+        </p:style>
+      </p:cxnSp>
+      <p:cxnSp>
+        <p:nvCxnSpPr>
+          <p:cNvPr id="74" name="Gerader Verbinder 73">
+            <a:extLst>
+              <a:ext uri="{FF2B5EF4-FFF2-40B4-BE49-F238E27FC236}">
+                <a16:creationId xmlns:a16="http://schemas.microsoft.com/office/drawing/2014/main" id="{477B70E3-4779-8CD2-9320-C3922DDD30D9}"/>
+              </a:ext>
+            </a:extLst>
+          </p:cNvPr>
+          <p:cNvCxnSpPr>
+            <a:cxnSpLocks/>
+          </p:cNvCxnSpPr>
+          <p:nvPr/>
+        </p:nvCxnSpPr>
+        <p:spPr>
+          <a:xfrm>
+            <a:off x="974891" y="2238575"/>
+            <a:ext cx="156381" cy="239121"/>
+          </a:xfrm>
+          <a:prstGeom prst="line">
+            <a:avLst/>
+          </a:prstGeom>
+          <a:ln w="12700" cap="rnd">
+            <a:solidFill>
+              <a:schemeClr val="tx1"/>
+            </a:solidFill>
+            <a:round/>
+          </a:ln>
+        </p:spPr>
+        <p:style>
+          <a:lnRef idx="2">
+            <a:schemeClr val="accent1"/>
+          </a:lnRef>
+          <a:fillRef idx="0">
+            <a:schemeClr val="accent1"/>
+          </a:fillRef>
+          <a:effectRef idx="1">
+            <a:schemeClr val="accent1"/>
+          </a:effectRef>
+          <a:fontRef idx="minor">
+            <a:schemeClr val="tx1"/>
+          </a:fontRef>
+        </p:style>
+      </p:cxnSp>
+      <p:cxnSp>
+        <p:nvCxnSpPr>
+          <p:cNvPr id="77" name="Gerader Verbinder 76">
+            <a:extLst>
+              <a:ext uri="{FF2B5EF4-FFF2-40B4-BE49-F238E27FC236}">
+                <a16:creationId xmlns:a16="http://schemas.microsoft.com/office/drawing/2014/main" id="{473C7F89-3AE6-5507-1FA8-A7CF37FF7CA3}"/>
+              </a:ext>
+            </a:extLst>
+          </p:cNvPr>
+          <p:cNvCxnSpPr>
+            <a:cxnSpLocks/>
+          </p:cNvCxnSpPr>
+          <p:nvPr/>
+        </p:nvCxnSpPr>
+        <p:spPr>
+          <a:xfrm>
+            <a:off x="909141" y="2238575"/>
+            <a:ext cx="156381" cy="239121"/>
+          </a:xfrm>
+          <a:prstGeom prst="line">
+            <a:avLst/>
+          </a:prstGeom>
+          <a:ln w="12700" cap="rnd">
+            <a:solidFill>
+              <a:schemeClr val="tx1"/>
+            </a:solidFill>
+            <a:round/>
+          </a:ln>
+        </p:spPr>
+        <p:style>
+          <a:lnRef idx="2">
+            <a:schemeClr val="accent1"/>
+          </a:lnRef>
+          <a:fillRef idx="0">
+            <a:schemeClr val="accent1"/>
+          </a:fillRef>
+          <a:effectRef idx="1">
+            <a:schemeClr val="accent1"/>
+          </a:effectRef>
+          <a:fontRef idx="minor">
+            <a:schemeClr val="tx1"/>
+          </a:fontRef>
+        </p:style>
+      </p:cxnSp>
+      <p:cxnSp>
+        <p:nvCxnSpPr>
+          <p:cNvPr id="85" name="Gerader Verbinder 84">
+            <a:extLst>
+              <a:ext uri="{FF2B5EF4-FFF2-40B4-BE49-F238E27FC236}">
+                <a16:creationId xmlns:a16="http://schemas.microsoft.com/office/drawing/2014/main" id="{65B14C8F-3F77-D3A1-5EE2-ED7EA7BEE2CA}"/>
+              </a:ext>
+            </a:extLst>
+          </p:cNvPr>
+          <p:cNvCxnSpPr>
+            <a:cxnSpLocks/>
+          </p:cNvCxnSpPr>
+          <p:nvPr/>
+        </p:nvCxnSpPr>
+        <p:spPr>
+          <a:xfrm>
+            <a:off x="870877" y="2283207"/>
+            <a:ext cx="127192" cy="194489"/>
+          </a:xfrm>
+          <a:prstGeom prst="line">
+            <a:avLst/>
+          </a:prstGeom>
+          <a:ln w="12700" cap="rnd">
+            <a:solidFill>
+              <a:schemeClr val="tx1"/>
+            </a:solidFill>
+            <a:round/>
+          </a:ln>
+        </p:spPr>
+        <p:style>
+          <a:lnRef idx="2">
+            <a:schemeClr val="accent1"/>
+          </a:lnRef>
+          <a:fillRef idx="0">
+            <a:schemeClr val="accent1"/>
+          </a:fillRef>
+          <a:effectRef idx="1">
+            <a:schemeClr val="accent1"/>
+          </a:effectRef>
+          <a:fontRef idx="minor">
+            <a:schemeClr val="tx1"/>
+          </a:fontRef>
+        </p:style>
+      </p:cxnSp>
+      <p:cxnSp>
+        <p:nvCxnSpPr>
+          <p:cNvPr id="91" name="Gerader Verbinder 90">
+            <a:extLst>
+              <a:ext uri="{FF2B5EF4-FFF2-40B4-BE49-F238E27FC236}">
+                <a16:creationId xmlns:a16="http://schemas.microsoft.com/office/drawing/2014/main" id="{76E50349-030E-5D55-04AF-BE81CB908616}"/>
+              </a:ext>
+            </a:extLst>
+          </p:cNvPr>
+          <p:cNvCxnSpPr>
+            <a:cxnSpLocks/>
+          </p:cNvCxnSpPr>
+          <p:nvPr/>
+        </p:nvCxnSpPr>
+        <p:spPr>
+          <a:xfrm>
+            <a:off x="841688" y="2337050"/>
+            <a:ext cx="89967" cy="137568"/>
+          </a:xfrm>
+          <a:prstGeom prst="line">
+            <a:avLst/>
+          </a:prstGeom>
+          <a:ln w="12700" cap="rnd">
+            <a:solidFill>
+              <a:schemeClr val="tx1"/>
+            </a:solidFill>
+            <a:round/>
+          </a:ln>
+        </p:spPr>
+        <p:style>
+          <a:lnRef idx="2">
+            <a:schemeClr val="accent1"/>
+          </a:lnRef>
+          <a:fillRef idx="0">
+            <a:schemeClr val="accent1"/>
+          </a:fillRef>
+          <a:effectRef idx="1">
+            <a:schemeClr val="accent1"/>
+          </a:effectRef>
+          <a:fontRef idx="minor">
+            <a:schemeClr val="tx1"/>
+          </a:fontRef>
+        </p:style>
+      </p:cxnSp>
+      <p:cxnSp>
+        <p:nvCxnSpPr>
+          <p:cNvPr id="93" name="Gerader Verbinder 92">
+            <a:extLst>
+              <a:ext uri="{FF2B5EF4-FFF2-40B4-BE49-F238E27FC236}">
+                <a16:creationId xmlns:a16="http://schemas.microsoft.com/office/drawing/2014/main" id="{0FF937FE-542B-0AF5-EDFB-D9A07DDC58B8}"/>
+              </a:ext>
+            </a:extLst>
+          </p:cNvPr>
+          <p:cNvCxnSpPr>
+            <a:cxnSpLocks/>
+          </p:cNvCxnSpPr>
+          <p:nvPr/>
+        </p:nvCxnSpPr>
+        <p:spPr>
+          <a:xfrm>
+            <a:off x="813592" y="2393811"/>
+            <a:ext cx="52846" cy="80807"/>
+          </a:xfrm>
+          <a:prstGeom prst="line">
+            <a:avLst/>
+          </a:prstGeom>
+          <a:ln w="12700" cap="rnd">
+            <a:solidFill>
+              <a:schemeClr val="tx1"/>
+            </a:solidFill>
+            <a:round/>
+          </a:ln>
+        </p:spPr>
+        <p:style>
+          <a:lnRef idx="2">
+            <a:schemeClr val="accent1"/>
+          </a:lnRef>
+          <a:fillRef idx="0">
+            <a:schemeClr val="accent1"/>
+          </a:fillRef>
+          <a:effectRef idx="1">
+            <a:schemeClr val="accent1"/>
+          </a:effectRef>
+          <a:fontRef idx="minor">
+            <a:schemeClr val="tx1"/>
+          </a:fontRef>
+        </p:style>
+      </p:cxnSp>
+      <p:cxnSp>
+        <p:nvCxnSpPr>
+          <p:cNvPr id="95" name="Gerader Verbinder 94">
+            <a:extLst>
+              <a:ext uri="{FF2B5EF4-FFF2-40B4-BE49-F238E27FC236}">
+                <a16:creationId xmlns:a16="http://schemas.microsoft.com/office/drawing/2014/main" id="{F668BF2D-AD45-00BF-B15D-3994E110C1B7}"/>
+              </a:ext>
+            </a:extLst>
+          </p:cNvPr>
+          <p:cNvCxnSpPr>
+            <a:cxnSpLocks/>
+          </p:cNvCxnSpPr>
+          <p:nvPr/>
+        </p:nvCxnSpPr>
+        <p:spPr>
+          <a:xfrm>
+            <a:off x="1168256" y="1713635"/>
+            <a:ext cx="54378" cy="83150"/>
+          </a:xfrm>
+          <a:prstGeom prst="line">
+            <a:avLst/>
+          </a:prstGeom>
+          <a:ln w="12700" cap="rnd">
+            <a:solidFill>
+              <a:schemeClr val="tx1"/>
+            </a:solidFill>
+            <a:round/>
+          </a:ln>
+        </p:spPr>
+        <p:style>
+          <a:lnRef idx="2">
+            <a:schemeClr val="accent1"/>
+          </a:lnRef>
+          <a:fillRef idx="0">
+            <a:schemeClr val="accent1"/>
+          </a:fillRef>
+          <a:effectRef idx="1">
+            <a:schemeClr val="accent1"/>
+          </a:effectRef>
+          <a:fontRef idx="minor">
+            <a:schemeClr val="tx1"/>
+          </a:fontRef>
+        </p:style>
+      </p:cxnSp>
+      <p:cxnSp>
+        <p:nvCxnSpPr>
+          <p:cNvPr id="97" name="Gerader Verbinder 96">
+            <a:extLst>
+              <a:ext uri="{FF2B5EF4-FFF2-40B4-BE49-F238E27FC236}">
+                <a16:creationId xmlns:a16="http://schemas.microsoft.com/office/drawing/2014/main" id="{EEC47DF1-801B-EB6D-0757-2354E9674287}"/>
+              </a:ext>
+            </a:extLst>
+          </p:cNvPr>
+          <p:cNvCxnSpPr>
+            <a:cxnSpLocks/>
+          </p:cNvCxnSpPr>
+          <p:nvPr/>
+        </p:nvCxnSpPr>
+        <p:spPr>
+          <a:xfrm>
+            <a:off x="1084514" y="2206600"/>
+            <a:ext cx="31693" cy="48462"/>
+          </a:xfrm>
+          <a:prstGeom prst="line">
+            <a:avLst/>
+          </a:prstGeom>
+          <a:ln w="12700" cap="rnd">
+            <a:solidFill>
+              <a:schemeClr val="tx1"/>
+            </a:solidFill>
+            <a:round/>
+          </a:ln>
+        </p:spPr>
+        <p:style>
+          <a:lnRef idx="2">
+            <a:schemeClr val="accent1"/>
+          </a:lnRef>
+          <a:fillRef idx="0">
+            <a:schemeClr val="accent1"/>
+          </a:fillRef>
+          <a:effectRef idx="1">
+            <a:schemeClr val="accent1"/>
+          </a:effectRef>
+          <a:fontRef idx="minor">
+            <a:schemeClr val="tx1"/>
+          </a:fontRef>
+        </p:style>
+      </p:cxnSp>
+      <p:cxnSp>
+        <p:nvCxnSpPr>
+          <p:cNvPr id="100" name="Gerader Verbinder 99">
+            <a:extLst>
+              <a:ext uri="{FF2B5EF4-FFF2-40B4-BE49-F238E27FC236}">
+                <a16:creationId xmlns:a16="http://schemas.microsoft.com/office/drawing/2014/main" id="{C8BE03CC-18E1-5B8F-2ADA-DED3C8A51DDA}"/>
+              </a:ext>
+            </a:extLst>
+          </p:cNvPr>
+          <p:cNvCxnSpPr>
+            <a:cxnSpLocks/>
+          </p:cNvCxnSpPr>
+          <p:nvPr/>
+        </p:nvCxnSpPr>
+        <p:spPr>
+          <a:xfrm>
+            <a:off x="1112823" y="2151859"/>
+            <a:ext cx="31693" cy="48462"/>
+          </a:xfrm>
+          <a:prstGeom prst="line">
+            <a:avLst/>
+          </a:prstGeom>
+          <a:ln w="12700" cap="rnd">
+            <a:solidFill>
+              <a:schemeClr val="tx1"/>
+            </a:solidFill>
+            <a:round/>
+          </a:ln>
+        </p:spPr>
+        <p:style>
+          <a:lnRef idx="2">
+            <a:schemeClr val="accent1"/>
+          </a:lnRef>
+          <a:fillRef idx="0">
+            <a:schemeClr val="accent1"/>
+          </a:fillRef>
+          <a:effectRef idx="1">
+            <a:schemeClr val="accent1"/>
+          </a:effectRef>
+          <a:fontRef idx="minor">
+            <a:schemeClr val="tx1"/>
+          </a:fontRef>
+        </p:style>
+      </p:cxnSp>
+      <p:cxnSp>
+        <p:nvCxnSpPr>
+          <p:cNvPr id="101" name="Gerader Verbinder 100">
+            <a:extLst>
+              <a:ext uri="{FF2B5EF4-FFF2-40B4-BE49-F238E27FC236}">
+                <a16:creationId xmlns:a16="http://schemas.microsoft.com/office/drawing/2014/main" id="{4A65D8BD-DC28-81FD-F090-8A9F49B355E7}"/>
+              </a:ext>
+            </a:extLst>
+          </p:cNvPr>
+          <p:cNvCxnSpPr>
+            <a:cxnSpLocks/>
+          </p:cNvCxnSpPr>
+          <p:nvPr/>
+        </p:nvCxnSpPr>
+        <p:spPr>
+          <a:xfrm>
+            <a:off x="1138781" y="2099023"/>
+            <a:ext cx="31693" cy="48462"/>
+          </a:xfrm>
+          <a:prstGeom prst="line">
+            <a:avLst/>
+          </a:prstGeom>
+          <a:ln w="12700" cap="rnd">
+            <a:solidFill>
+              <a:schemeClr val="tx1"/>
+            </a:solidFill>
+            <a:round/>
+          </a:ln>
+        </p:spPr>
+        <p:style>
+          <a:lnRef idx="2">
+            <a:schemeClr val="accent1"/>
+          </a:lnRef>
+          <a:fillRef idx="0">
+            <a:schemeClr val="accent1"/>
+          </a:fillRef>
+          <a:effectRef idx="1">
+            <a:schemeClr val="accent1"/>
+          </a:effectRef>
+          <a:fontRef idx="minor">
+            <a:schemeClr val="tx1"/>
+          </a:fontRef>
+        </p:style>
+      </p:cxnSp>
+      <p:cxnSp>
+        <p:nvCxnSpPr>
+          <p:cNvPr id="102" name="Gerader Verbinder 101">
+            <a:extLst>
+              <a:ext uri="{FF2B5EF4-FFF2-40B4-BE49-F238E27FC236}">
+                <a16:creationId xmlns:a16="http://schemas.microsoft.com/office/drawing/2014/main" id="{9B529AC9-7A0C-4924-AD00-CBFD3280473C}"/>
+              </a:ext>
+            </a:extLst>
+          </p:cNvPr>
+          <p:cNvCxnSpPr>
+            <a:cxnSpLocks/>
+          </p:cNvCxnSpPr>
+          <p:nvPr/>
+        </p:nvCxnSpPr>
+        <p:spPr>
+          <a:xfrm>
+            <a:off x="1168460" y="2040379"/>
+            <a:ext cx="31693" cy="48462"/>
+          </a:xfrm>
+          <a:prstGeom prst="line">
+            <a:avLst/>
+          </a:prstGeom>
+          <a:ln w="12700" cap="rnd">
+            <a:solidFill>
+              <a:schemeClr val="tx1"/>
+            </a:solidFill>
+            <a:round/>
+          </a:ln>
+        </p:spPr>
+        <p:style>
+          <a:lnRef idx="2">
+            <a:schemeClr val="accent1"/>
+          </a:lnRef>
+          <a:fillRef idx="0">
+            <a:schemeClr val="accent1"/>
+          </a:fillRef>
+          <a:effectRef idx="1">
+            <a:schemeClr val="accent1"/>
+          </a:effectRef>
+          <a:fontRef idx="minor">
+            <a:schemeClr val="tx1"/>
+          </a:fontRef>
+        </p:style>
+      </p:cxnSp>
+      <p:cxnSp>
+        <p:nvCxnSpPr>
+          <p:cNvPr id="103" name="Gerader Verbinder 102">
+            <a:extLst>
+              <a:ext uri="{FF2B5EF4-FFF2-40B4-BE49-F238E27FC236}">
+                <a16:creationId xmlns:a16="http://schemas.microsoft.com/office/drawing/2014/main" id="{2194F1F0-570E-7F9C-2EF9-31F4C1A0F596}"/>
+              </a:ext>
+            </a:extLst>
+          </p:cNvPr>
+          <p:cNvCxnSpPr>
+            <a:cxnSpLocks/>
+          </p:cNvCxnSpPr>
+          <p:nvPr/>
+        </p:nvCxnSpPr>
+        <p:spPr>
+          <a:xfrm>
+            <a:off x="1196788" y="1987953"/>
+            <a:ext cx="31693" cy="48462"/>
+          </a:xfrm>
+          <a:prstGeom prst="line">
+            <a:avLst/>
+          </a:prstGeom>
+          <a:ln w="12700" cap="rnd">
+            <a:solidFill>
+              <a:schemeClr val="tx1"/>
+            </a:solidFill>
+            <a:round/>
+          </a:ln>
+        </p:spPr>
+        <p:style>
+          <a:lnRef idx="2">
+            <a:schemeClr val="accent1"/>
+          </a:lnRef>
+          <a:fillRef idx="0">
+            <a:schemeClr val="accent1"/>
+          </a:fillRef>
+          <a:effectRef idx="1">
+            <a:schemeClr val="accent1"/>
+          </a:effectRef>
+          <a:fontRef idx="minor">
+            <a:schemeClr val="tx1"/>
+          </a:fontRef>
+        </p:style>
+      </p:cxnSp>
+      <p:cxnSp>
+        <p:nvCxnSpPr>
+          <p:cNvPr id="104" name="Gerader Verbinder 103">
+            <a:extLst>
+              <a:ext uri="{FF2B5EF4-FFF2-40B4-BE49-F238E27FC236}">
+                <a16:creationId xmlns:a16="http://schemas.microsoft.com/office/drawing/2014/main" id="{0E60EA62-D4F1-93D2-410B-53817F770D69}"/>
+              </a:ext>
+            </a:extLst>
+          </p:cNvPr>
+          <p:cNvCxnSpPr>
+            <a:cxnSpLocks/>
+          </p:cNvCxnSpPr>
+          <p:nvPr/>
+        </p:nvCxnSpPr>
+        <p:spPr>
+          <a:xfrm>
+            <a:off x="1240282" y="1957950"/>
+            <a:ext cx="16606" cy="25392"/>
+          </a:xfrm>
+          <a:prstGeom prst="line">
+            <a:avLst/>
+          </a:prstGeom>
+          <a:ln w="12700" cap="rnd">
+            <a:solidFill>
+              <a:schemeClr val="tx1"/>
+            </a:solidFill>
+            <a:round/>
+          </a:ln>
+        </p:spPr>
+        <p:style>
+          <a:lnRef idx="2">
+            <a:schemeClr val="accent1"/>
+          </a:lnRef>
+          <a:fillRef idx="0">
+            <a:schemeClr val="accent1"/>
+          </a:fillRef>
+          <a:effectRef idx="1">
+            <a:schemeClr val="accent1"/>
+          </a:effectRef>
+          <a:fontRef idx="minor">
+            <a:schemeClr val="tx1"/>
+          </a:fontRef>
+        </p:style>
+      </p:cxnSp>
+      <p:cxnSp>
+        <p:nvCxnSpPr>
+          <p:cNvPr id="106" name="Gerader Verbinder 105">
+            <a:extLst>
+              <a:ext uri="{FF2B5EF4-FFF2-40B4-BE49-F238E27FC236}">
+                <a16:creationId xmlns:a16="http://schemas.microsoft.com/office/drawing/2014/main" id="{E4D5367B-47C2-5AF7-3D35-3DDB763AA01B}"/>
+              </a:ext>
+            </a:extLst>
+          </p:cNvPr>
+          <p:cNvCxnSpPr>
+            <a:cxnSpLocks/>
+          </p:cNvCxnSpPr>
+          <p:nvPr/>
+        </p:nvCxnSpPr>
+        <p:spPr>
+          <a:xfrm>
+            <a:off x="1308947" y="1440768"/>
+            <a:ext cx="127820" cy="195448"/>
+          </a:xfrm>
+          <a:prstGeom prst="line">
+            <a:avLst/>
+          </a:prstGeom>
+          <a:ln w="12700" cap="rnd">
+            <a:solidFill>
+              <a:schemeClr val="tx1"/>
+            </a:solidFill>
+            <a:round/>
+          </a:ln>
+        </p:spPr>
+        <p:style>
+          <a:lnRef idx="2">
+            <a:schemeClr val="accent1"/>
+          </a:lnRef>
+          <a:fillRef idx="0">
+            <a:schemeClr val="accent1"/>
+          </a:fillRef>
+          <a:effectRef idx="1">
+            <a:schemeClr val="accent1"/>
+          </a:effectRef>
+          <a:fontRef idx="minor">
+            <a:schemeClr val="tx1"/>
+          </a:fontRef>
+        </p:style>
+      </p:cxnSp>
+      <p:cxnSp>
+        <p:nvCxnSpPr>
+          <p:cNvPr id="107" name="Gerader Verbinder 106">
+            <a:extLst>
+              <a:ext uri="{FF2B5EF4-FFF2-40B4-BE49-F238E27FC236}">
+                <a16:creationId xmlns:a16="http://schemas.microsoft.com/office/drawing/2014/main" id="{1FFAD302-A4AF-4B03-FFDA-BAB01E22481F}"/>
+              </a:ext>
+            </a:extLst>
+          </p:cNvPr>
+          <p:cNvCxnSpPr>
+            <a:cxnSpLocks/>
+          </p:cNvCxnSpPr>
+          <p:nvPr/>
+        </p:nvCxnSpPr>
+        <p:spPr>
+          <a:xfrm>
+            <a:off x="1337623" y="1387920"/>
+            <a:ext cx="127820" cy="195448"/>
+          </a:xfrm>
+          <a:prstGeom prst="line">
+            <a:avLst/>
+          </a:prstGeom>
+          <a:ln w="12700" cap="rnd">
+            <a:solidFill>
+              <a:schemeClr val="tx1"/>
+            </a:solidFill>
+            <a:round/>
+          </a:ln>
+        </p:spPr>
+        <p:style>
+          <a:lnRef idx="2">
+            <a:schemeClr val="accent1"/>
+          </a:lnRef>
+          <a:fillRef idx="0">
+            <a:schemeClr val="accent1"/>
+          </a:fillRef>
+          <a:effectRef idx="1">
+            <a:schemeClr val="accent1"/>
+          </a:effectRef>
+          <a:fontRef idx="minor">
+            <a:schemeClr val="tx1"/>
+          </a:fontRef>
+        </p:style>
+      </p:cxnSp>
+      <p:cxnSp>
+        <p:nvCxnSpPr>
+          <p:cNvPr id="108" name="Gerader Verbinder 107">
+            <a:extLst>
+              <a:ext uri="{FF2B5EF4-FFF2-40B4-BE49-F238E27FC236}">
+                <a16:creationId xmlns:a16="http://schemas.microsoft.com/office/drawing/2014/main" id="{2C52E869-C238-5B80-BD28-B188FFD5E0AA}"/>
+              </a:ext>
+            </a:extLst>
+          </p:cNvPr>
+          <p:cNvCxnSpPr>
+            <a:cxnSpLocks/>
+          </p:cNvCxnSpPr>
+          <p:nvPr/>
+        </p:nvCxnSpPr>
+        <p:spPr>
+          <a:xfrm>
+            <a:off x="1366206" y="1336217"/>
+            <a:ext cx="127820" cy="195448"/>
+          </a:xfrm>
+          <a:prstGeom prst="line">
+            <a:avLst/>
+          </a:prstGeom>
+          <a:ln w="12700" cap="rnd">
+            <a:solidFill>
+              <a:schemeClr val="tx1"/>
+            </a:solidFill>
+            <a:round/>
+          </a:ln>
+        </p:spPr>
+        <p:style>
+          <a:lnRef idx="2">
+            <a:schemeClr val="accent1"/>
+          </a:lnRef>
+          <a:fillRef idx="0">
+            <a:schemeClr val="accent1"/>
+          </a:fillRef>
+          <a:effectRef idx="1">
+            <a:schemeClr val="accent1"/>
+          </a:effectRef>
+          <a:fontRef idx="minor">
+            <a:schemeClr val="tx1"/>
+          </a:fontRef>
+        </p:style>
+      </p:cxnSp>
+      <p:cxnSp>
+        <p:nvCxnSpPr>
+          <p:cNvPr id="109" name="Gerader Verbinder 108">
+            <a:extLst>
+              <a:ext uri="{FF2B5EF4-FFF2-40B4-BE49-F238E27FC236}">
+                <a16:creationId xmlns:a16="http://schemas.microsoft.com/office/drawing/2014/main" id="{440FFADC-B04F-521E-8DAF-076A84A60947}"/>
+              </a:ext>
+            </a:extLst>
+          </p:cNvPr>
+          <p:cNvCxnSpPr>
+            <a:cxnSpLocks/>
+          </p:cNvCxnSpPr>
+          <p:nvPr/>
+        </p:nvCxnSpPr>
+        <p:spPr>
+          <a:xfrm>
+            <a:off x="1394789" y="1284514"/>
+            <a:ext cx="127820" cy="195448"/>
+          </a:xfrm>
+          <a:prstGeom prst="line">
+            <a:avLst/>
+          </a:prstGeom>
+          <a:ln w="12700" cap="rnd">
+            <a:solidFill>
+              <a:schemeClr val="tx1"/>
+            </a:solidFill>
+            <a:round/>
+          </a:ln>
+        </p:spPr>
+        <p:style>
+          <a:lnRef idx="2">
+            <a:schemeClr val="accent1"/>
+          </a:lnRef>
+          <a:fillRef idx="0">
+            <a:schemeClr val="accent1"/>
+          </a:fillRef>
+          <a:effectRef idx="1">
+            <a:schemeClr val="accent1"/>
+          </a:effectRef>
+          <a:fontRef idx="minor">
+            <a:schemeClr val="tx1"/>
+          </a:fontRef>
+        </p:style>
+      </p:cxnSp>
+      <p:cxnSp>
+        <p:nvCxnSpPr>
+          <p:cNvPr id="110" name="Gerader Verbinder 109">
+            <a:extLst>
+              <a:ext uri="{FF2B5EF4-FFF2-40B4-BE49-F238E27FC236}">
+                <a16:creationId xmlns:a16="http://schemas.microsoft.com/office/drawing/2014/main" id="{FC01FF9F-5BEF-E6DD-70C1-1A6DF87AB1C4}"/>
+              </a:ext>
+            </a:extLst>
+          </p:cNvPr>
+          <p:cNvCxnSpPr>
+            <a:cxnSpLocks/>
+          </p:cNvCxnSpPr>
+          <p:nvPr/>
+        </p:nvCxnSpPr>
+        <p:spPr>
+          <a:xfrm>
+            <a:off x="1419284" y="1226632"/>
+            <a:ext cx="127820" cy="195448"/>
+          </a:xfrm>
+          <a:prstGeom prst="line">
+            <a:avLst/>
+          </a:prstGeom>
+          <a:ln w="12700" cap="rnd">
+            <a:solidFill>
+              <a:schemeClr val="tx1"/>
+            </a:solidFill>
+            <a:round/>
+          </a:ln>
+        </p:spPr>
+        <p:style>
+          <a:lnRef idx="2">
+            <a:schemeClr val="accent1"/>
+          </a:lnRef>
+          <a:fillRef idx="0">
+            <a:schemeClr val="accent1"/>
+          </a:fillRef>
+          <a:effectRef idx="1">
+            <a:schemeClr val="accent1"/>
+          </a:effectRef>
+          <a:fontRef idx="minor">
+            <a:schemeClr val="tx1"/>
+          </a:fontRef>
+        </p:style>
+      </p:cxnSp>
+      <p:cxnSp>
+        <p:nvCxnSpPr>
+          <p:cNvPr id="111" name="Gerader Verbinder 110">
+            <a:extLst>
+              <a:ext uri="{FF2B5EF4-FFF2-40B4-BE49-F238E27FC236}">
+                <a16:creationId xmlns:a16="http://schemas.microsoft.com/office/drawing/2014/main" id="{492FA843-3286-8CBD-F942-164480549A06}"/>
+              </a:ext>
+            </a:extLst>
+          </p:cNvPr>
+          <p:cNvCxnSpPr>
+            <a:cxnSpLocks/>
+          </p:cNvCxnSpPr>
+          <p:nvPr/>
+        </p:nvCxnSpPr>
+        <p:spPr>
+          <a:xfrm>
+            <a:off x="1447960" y="1173784"/>
+            <a:ext cx="127820" cy="195448"/>
+          </a:xfrm>
+          <a:prstGeom prst="line">
+            <a:avLst/>
+          </a:prstGeom>
+          <a:ln w="12700" cap="rnd">
+            <a:solidFill>
+              <a:schemeClr val="tx1"/>
+            </a:solidFill>
+            <a:round/>
+          </a:ln>
+        </p:spPr>
+        <p:style>
+          <a:lnRef idx="2">
+            <a:schemeClr val="accent1"/>
+          </a:lnRef>
+          <a:fillRef idx="0">
+            <a:schemeClr val="accent1"/>
+          </a:fillRef>
+          <a:effectRef idx="1">
+            <a:schemeClr val="accent1"/>
+          </a:effectRef>
+          <a:fontRef idx="minor">
+            <a:schemeClr val="tx1"/>
+          </a:fontRef>
+        </p:style>
+      </p:cxnSp>
+      <p:cxnSp>
+        <p:nvCxnSpPr>
+          <p:cNvPr id="112" name="Gerader Verbinder 111">
+            <a:extLst>
+              <a:ext uri="{FF2B5EF4-FFF2-40B4-BE49-F238E27FC236}">
+                <a16:creationId xmlns:a16="http://schemas.microsoft.com/office/drawing/2014/main" id="{E4FDF65D-5BA3-4FC0-E9EF-2FD5C580EE9A}"/>
+              </a:ext>
+            </a:extLst>
+          </p:cNvPr>
+          <p:cNvCxnSpPr>
+            <a:cxnSpLocks/>
+          </p:cNvCxnSpPr>
+          <p:nvPr/>
+        </p:nvCxnSpPr>
+        <p:spPr>
+          <a:xfrm>
+            <a:off x="1476543" y="1122081"/>
+            <a:ext cx="127820" cy="195448"/>
+          </a:xfrm>
+          <a:prstGeom prst="line">
+            <a:avLst/>
+          </a:prstGeom>
+          <a:ln w="12700" cap="rnd">
+            <a:solidFill>
+              <a:schemeClr val="tx1"/>
+            </a:solidFill>
+            <a:round/>
+          </a:ln>
+        </p:spPr>
+        <p:style>
+          <a:lnRef idx="2">
+            <a:schemeClr val="accent1"/>
+          </a:lnRef>
+          <a:fillRef idx="0">
+            <a:schemeClr val="accent1"/>
+          </a:fillRef>
+          <a:effectRef idx="1">
+            <a:schemeClr val="accent1"/>
+          </a:effectRef>
+          <a:fontRef idx="minor">
+            <a:schemeClr val="tx1"/>
+          </a:fontRef>
+        </p:style>
+      </p:cxnSp>
+      <p:cxnSp>
+        <p:nvCxnSpPr>
+          <p:cNvPr id="113" name="Gerader Verbinder 112">
+            <a:extLst>
+              <a:ext uri="{FF2B5EF4-FFF2-40B4-BE49-F238E27FC236}">
+                <a16:creationId xmlns:a16="http://schemas.microsoft.com/office/drawing/2014/main" id="{BE7613EC-3FF0-AC7F-3920-478CBB445C62}"/>
+              </a:ext>
+            </a:extLst>
+          </p:cNvPr>
+          <p:cNvCxnSpPr>
+            <a:cxnSpLocks/>
+          </p:cNvCxnSpPr>
+          <p:nvPr/>
+        </p:nvCxnSpPr>
+        <p:spPr>
+          <a:xfrm>
+            <a:off x="1505126" y="1070378"/>
+            <a:ext cx="127820" cy="195448"/>
+          </a:xfrm>
+          <a:prstGeom prst="line">
+            <a:avLst/>
+          </a:prstGeom>
+          <a:ln w="12700" cap="rnd">
+            <a:solidFill>
+              <a:schemeClr val="tx1"/>
+            </a:solidFill>
+            <a:round/>
+          </a:ln>
+        </p:spPr>
+        <p:style>
+          <a:lnRef idx="2">
+            <a:schemeClr val="accent1"/>
+          </a:lnRef>
+          <a:fillRef idx="0">
+            <a:schemeClr val="accent1"/>
+          </a:fillRef>
+          <a:effectRef idx="1">
+            <a:schemeClr val="accent1"/>
+          </a:effectRef>
+          <a:fontRef idx="minor">
+            <a:schemeClr val="tx1"/>
+          </a:fontRef>
+        </p:style>
+      </p:cxnSp>
+      <p:cxnSp>
+        <p:nvCxnSpPr>
+          <p:cNvPr id="114" name="Gerader Verbinder 113">
+            <a:extLst>
+              <a:ext uri="{FF2B5EF4-FFF2-40B4-BE49-F238E27FC236}">
+                <a16:creationId xmlns:a16="http://schemas.microsoft.com/office/drawing/2014/main" id="{E68BABE3-CC48-6179-D625-520AEDE495E5}"/>
+              </a:ext>
+            </a:extLst>
+          </p:cNvPr>
+          <p:cNvCxnSpPr>
+            <a:cxnSpLocks/>
+          </p:cNvCxnSpPr>
+          <p:nvPr/>
+        </p:nvCxnSpPr>
+        <p:spPr>
+          <a:xfrm>
+            <a:off x="1532227" y="1014664"/>
+            <a:ext cx="127820" cy="195448"/>
+          </a:xfrm>
+          <a:prstGeom prst="line">
+            <a:avLst/>
+          </a:prstGeom>
+          <a:ln w="12700" cap="rnd">
+            <a:solidFill>
+              <a:schemeClr val="tx1"/>
+            </a:solidFill>
+            <a:round/>
+          </a:ln>
+        </p:spPr>
+        <p:style>
+          <a:lnRef idx="2">
+            <a:schemeClr val="accent1"/>
+          </a:lnRef>
+          <a:fillRef idx="0">
+            <a:schemeClr val="accent1"/>
+          </a:fillRef>
+          <a:effectRef idx="1">
+            <a:schemeClr val="accent1"/>
+          </a:effectRef>
+          <a:fontRef idx="minor">
+            <a:schemeClr val="tx1"/>
+          </a:fontRef>
+        </p:style>
+      </p:cxnSp>
+      <p:cxnSp>
+        <p:nvCxnSpPr>
+          <p:cNvPr id="115" name="Gerader Verbinder 114">
+            <a:extLst>
+              <a:ext uri="{FF2B5EF4-FFF2-40B4-BE49-F238E27FC236}">
+                <a16:creationId xmlns:a16="http://schemas.microsoft.com/office/drawing/2014/main" id="{FB62CC2F-13C7-D515-AF6C-81AE80064417}"/>
+              </a:ext>
+            </a:extLst>
+          </p:cNvPr>
+          <p:cNvCxnSpPr>
+            <a:cxnSpLocks/>
+          </p:cNvCxnSpPr>
+          <p:nvPr/>
+        </p:nvCxnSpPr>
+        <p:spPr>
+          <a:xfrm>
+            <a:off x="1560903" y="961816"/>
+            <a:ext cx="127820" cy="195448"/>
+          </a:xfrm>
+          <a:prstGeom prst="line">
+            <a:avLst/>
+          </a:prstGeom>
+          <a:ln w="12700" cap="rnd">
+            <a:solidFill>
+              <a:schemeClr val="tx1"/>
+            </a:solidFill>
+            <a:round/>
+          </a:ln>
+        </p:spPr>
+        <p:style>
+          <a:lnRef idx="2">
+            <a:schemeClr val="accent1"/>
+          </a:lnRef>
+          <a:fillRef idx="0">
+            <a:schemeClr val="accent1"/>
+          </a:fillRef>
+          <a:effectRef idx="1">
+            <a:schemeClr val="accent1"/>
+          </a:effectRef>
+          <a:fontRef idx="minor">
+            <a:schemeClr val="tx1"/>
+          </a:fontRef>
+        </p:style>
+      </p:cxnSp>
+      <p:cxnSp>
+        <p:nvCxnSpPr>
+          <p:cNvPr id="116" name="Gerader Verbinder 115">
+            <a:extLst>
+              <a:ext uri="{FF2B5EF4-FFF2-40B4-BE49-F238E27FC236}">
+                <a16:creationId xmlns:a16="http://schemas.microsoft.com/office/drawing/2014/main" id="{A8391B36-28D5-C34F-D5A0-95DDD14A388B}"/>
+              </a:ext>
+            </a:extLst>
+          </p:cNvPr>
+          <p:cNvCxnSpPr>
+            <a:cxnSpLocks/>
+          </p:cNvCxnSpPr>
+          <p:nvPr/>
+        </p:nvCxnSpPr>
+        <p:spPr>
+          <a:xfrm>
+            <a:off x="1589486" y="910113"/>
+            <a:ext cx="127820" cy="195448"/>
+          </a:xfrm>
+          <a:prstGeom prst="line">
+            <a:avLst/>
+          </a:prstGeom>
+          <a:ln w="12700" cap="rnd">
+            <a:solidFill>
+              <a:schemeClr val="tx1"/>
+            </a:solidFill>
+            <a:round/>
+          </a:ln>
+        </p:spPr>
+        <p:style>
+          <a:lnRef idx="2">
+            <a:schemeClr val="accent1"/>
+          </a:lnRef>
+          <a:fillRef idx="0">
+            <a:schemeClr val="accent1"/>
+          </a:fillRef>
+          <a:effectRef idx="1">
+            <a:schemeClr val="accent1"/>
+          </a:effectRef>
+          <a:fontRef idx="minor">
+            <a:schemeClr val="tx1"/>
+          </a:fontRef>
+        </p:style>
+      </p:cxnSp>
+      <p:sp>
+        <p:nvSpPr>
+          <p:cNvPr id="118" name="Textfeld 117">
+            <a:extLst>
+              <a:ext uri="{FF2B5EF4-FFF2-40B4-BE49-F238E27FC236}">
+                <a16:creationId xmlns:a16="http://schemas.microsoft.com/office/drawing/2014/main" id="{4A030151-91D2-127A-726F-6C77837075EC}"/>
+              </a:ext>
+            </a:extLst>
+          </p:cNvPr>
+          <p:cNvSpPr txBox="1"/>
+          <p:nvPr/>
+        </p:nvSpPr>
+        <p:spPr>
+          <a:xfrm>
+            <a:off x="1159719" y="1909239"/>
+            <a:ext cx="353054" cy="369332"/>
+          </a:xfrm>
+          <a:prstGeom prst="rect">
+            <a:avLst/>
+          </a:prstGeom>
+          <a:noFill/>
+        </p:spPr>
+        <p:txBody>
+          <a:bodyPr wrap="square" rtlCol="0">
+            <a:spAutoFit/>
+          </a:bodyPr>
+          <a:lstStyle/>
+          <a:p>
+            <a:pPr algn="ctr"/>
+            <a:r>
+              <a:rPr lang="el-GR" i="1" dirty="0">
+                <a:solidFill>
+                  <a:schemeClr val="tx1">
+                    <a:lumMod val="65000"/>
+                    <a:lumOff val="35000"/>
+                  </a:schemeClr>
+                </a:solidFill>
+                <a:latin typeface="CMU Serif" panose="02000603000000000000" pitchFamily="2" charset="0"/>
+                <a:ea typeface="CMU Serif" panose="02000603000000000000" pitchFamily="2" charset="0"/>
+                <a:cs typeface="CMU Serif" panose="02000603000000000000" pitchFamily="2" charset="0"/>
+              </a:rPr>
+              <a:t>ε</a:t>
+            </a:r>
+            <a:endParaRPr lang="de-DE" i="1" u="sng" dirty="0">
+              <a:solidFill>
+                <a:schemeClr val="tx1">
+                  <a:lumMod val="65000"/>
+                  <a:lumOff val="35000"/>
+                </a:schemeClr>
+              </a:solidFill>
+              <a:latin typeface="CMU Serif" panose="02000603000000000000" pitchFamily="2" charset="0"/>
+              <a:ea typeface="CMU Serif" panose="02000603000000000000" pitchFamily="2" charset="0"/>
+              <a:cs typeface="CMU Serif" panose="02000603000000000000" pitchFamily="2" charset="0"/>
+            </a:endParaRPr>
+          </a:p>
+        </p:txBody>
+      </p:sp>
+      <p:cxnSp>
+        <p:nvCxnSpPr>
+          <p:cNvPr id="119" name="Gerader Verbinder 118">
+            <a:extLst>
+              <a:ext uri="{FF2B5EF4-FFF2-40B4-BE49-F238E27FC236}">
+                <a16:creationId xmlns:a16="http://schemas.microsoft.com/office/drawing/2014/main" id="{2CD7C9C7-C2F8-E517-7950-93A7DF75B856}"/>
+              </a:ext>
+            </a:extLst>
+          </p:cNvPr>
+          <p:cNvCxnSpPr>
+            <a:cxnSpLocks/>
+          </p:cNvCxnSpPr>
+          <p:nvPr/>
+        </p:nvCxnSpPr>
+        <p:spPr>
+          <a:xfrm>
+            <a:off x="1102711" y="910113"/>
+            <a:ext cx="0" cy="1368994"/>
+          </a:xfrm>
+          <a:prstGeom prst="line">
+            <a:avLst/>
+          </a:prstGeom>
+          <a:ln cap="rnd">
+            <a:round/>
+            <a:headEnd type="stealth" w="lg" len="lg"/>
+          </a:ln>
+        </p:spPr>
+        <p:style>
+          <a:lnRef idx="2">
+            <a:schemeClr val="dk1"/>
+          </a:lnRef>
+          <a:fillRef idx="0">
+            <a:schemeClr val="dk1"/>
+          </a:fillRef>
+          <a:effectRef idx="1">
+            <a:schemeClr val="dk1"/>
+          </a:effectRef>
+          <a:fontRef idx="minor">
+            <a:schemeClr val="tx1"/>
+          </a:fontRef>
+        </p:style>
+      </p:cxnSp>
+      <p:sp>
+        <p:nvSpPr>
+          <p:cNvPr id="124" name="Textfeld 123">
+            <a:extLst>
+              <a:ext uri="{FF2B5EF4-FFF2-40B4-BE49-F238E27FC236}">
+                <a16:creationId xmlns:a16="http://schemas.microsoft.com/office/drawing/2014/main" id="{92985835-64DD-8636-181C-26DE247A5F75}"/>
+              </a:ext>
+            </a:extLst>
+          </p:cNvPr>
+          <p:cNvSpPr txBox="1"/>
+          <p:nvPr/>
+        </p:nvSpPr>
+        <p:spPr>
+          <a:xfrm>
+            <a:off x="662047" y="726928"/>
+            <a:ext cx="484119" cy="369332"/>
+          </a:xfrm>
+          <a:prstGeom prst="rect">
+            <a:avLst/>
+          </a:prstGeom>
+          <a:noFill/>
+        </p:spPr>
+        <p:txBody>
+          <a:bodyPr wrap="square" rtlCol="0">
+            <a:spAutoFit/>
+          </a:bodyPr>
+          <a:lstStyle/>
+          <a:p>
+            <a:pPr algn="ctr"/>
+            <a:r>
+              <a:rPr lang="de-DE" i="1" dirty="0">
+                <a:latin typeface="CMU Serif" panose="02000603000000000000" pitchFamily="2" charset="0"/>
+                <a:ea typeface="CMU Serif" panose="02000603000000000000" pitchFamily="2" charset="0"/>
+                <a:cs typeface="CMU Serif" panose="02000603000000000000" pitchFamily="2" charset="0"/>
+              </a:rPr>
+              <a:t>y</a:t>
+            </a:r>
+          </a:p>
+        </p:txBody>
+      </p:sp>
+      <p:sp>
+        <p:nvSpPr>
+          <p:cNvPr id="125" name="Freihandform: Form 124">
+            <a:extLst>
+              <a:ext uri="{FF2B5EF4-FFF2-40B4-BE49-F238E27FC236}">
+                <a16:creationId xmlns:a16="http://schemas.microsoft.com/office/drawing/2014/main" id="{49ED1080-FF97-6182-EEA9-1865DCB3C75C}"/>
+              </a:ext>
+            </a:extLst>
+          </p:cNvPr>
+          <p:cNvSpPr/>
+          <p:nvPr/>
+        </p:nvSpPr>
+        <p:spPr>
+          <a:xfrm>
+            <a:off x="1642766" y="1114816"/>
+            <a:ext cx="909413" cy="1055318"/>
+          </a:xfrm>
+          <a:custGeom>
+            <a:avLst/>
+            <a:gdLst>
+              <a:gd name="connsiteX0" fmla="*/ 345741 w 909413"/>
+              <a:gd name="connsiteY0" fmla="*/ 0 h 1055318"/>
+              <a:gd name="connsiteX1" fmla="*/ 23196 w 909413"/>
+              <a:gd name="connsiteY1" fmla="*/ 876822 h 1055318"/>
+              <a:gd name="connsiteX2" fmla="*/ 909413 w 909413"/>
+              <a:gd name="connsiteY2" fmla="*/ 1055318 h 1055318"/>
+            </a:gdLst>
+            <a:ahLst/>
+            <a:cxnLst>
+              <a:cxn ang="0">
+                <a:pos x="connsiteX0" y="connsiteY0"/>
+              </a:cxn>
+              <a:cxn ang="0">
+                <a:pos x="connsiteX1" y="connsiteY1"/>
+              </a:cxn>
+              <a:cxn ang="0">
+                <a:pos x="connsiteX2" y="connsiteY2"/>
+              </a:cxn>
+            </a:cxnLst>
+            <a:rect l="l" t="t" r="r" b="b"/>
+            <a:pathLst>
+              <a:path w="909413" h="1055318">
+                <a:moveTo>
+                  <a:pt x="345741" y="0"/>
+                </a:moveTo>
+                <a:cubicBezTo>
+                  <a:pt x="137496" y="350468"/>
+                  <a:pt x="-70749" y="700936"/>
+                  <a:pt x="23196" y="876822"/>
+                </a:cubicBezTo>
+                <a:cubicBezTo>
+                  <a:pt x="117141" y="1052708"/>
+                  <a:pt x="513277" y="1054013"/>
+                  <a:pt x="909413" y="1055318"/>
+                </a:cubicBezTo>
+              </a:path>
+            </a:pathLst>
+          </a:custGeom>
+          <a:noFill/>
+          <a:ln cap="rnd">
+            <a:solidFill>
+              <a:schemeClr val="accent1"/>
+            </a:solidFill>
+            <a:round/>
+            <a:tailEnd type="stealth" w="lg" len="lg"/>
+          </a:ln>
+        </p:spPr>
+        <p:style>
+          <a:lnRef idx="2">
+            <a:schemeClr val="accent1">
+              <a:shade val="15000"/>
+            </a:schemeClr>
+          </a:lnRef>
+          <a:fillRef idx="1">
+            <a:schemeClr val="accent1"/>
+          </a:fillRef>
+          <a:effectRef idx="0">
+            <a:schemeClr val="accent1"/>
+          </a:effectRef>
+          <a:fontRef idx="minor">
+            <a:schemeClr val="lt1"/>
+          </a:fontRef>
+        </p:style>
+        <p:txBody>
+          <a:bodyPr rtlCol="0" anchor="ctr"/>
+          <a:lstStyle/>
+          <a:p>
+            <a:pPr algn="ctr"/>
+            <a:endParaRPr lang="de-DE"/>
+          </a:p>
+        </p:txBody>
+      </p:sp>
+      <p:sp>
+        <p:nvSpPr>
+          <p:cNvPr id="126" name="Freihandform: Form 125">
+            <a:extLst>
+              <a:ext uri="{FF2B5EF4-FFF2-40B4-BE49-F238E27FC236}">
+                <a16:creationId xmlns:a16="http://schemas.microsoft.com/office/drawing/2014/main" id="{FADE99E2-CD3E-190D-EC3C-30CE0EC4AC21}"/>
+              </a:ext>
+            </a:extLst>
+          </p:cNvPr>
+          <p:cNvSpPr/>
+          <p:nvPr/>
+        </p:nvSpPr>
+        <p:spPr>
+          <a:xfrm>
+            <a:off x="1949747" y="1042787"/>
+            <a:ext cx="661932" cy="958241"/>
+          </a:xfrm>
+          <a:custGeom>
+            <a:avLst/>
+            <a:gdLst>
+              <a:gd name="connsiteX0" fmla="*/ 283019 w 661932"/>
+              <a:gd name="connsiteY0" fmla="*/ 0 h 958241"/>
+              <a:gd name="connsiteX1" fmla="*/ 13710 w 661932"/>
+              <a:gd name="connsiteY1" fmla="*/ 795403 h 958241"/>
+              <a:gd name="connsiteX2" fmla="*/ 661932 w 661932"/>
+              <a:gd name="connsiteY2" fmla="*/ 958241 h 958241"/>
+            </a:gdLst>
+            <a:ahLst/>
+            <a:cxnLst>
+              <a:cxn ang="0">
+                <a:pos x="connsiteX0" y="connsiteY0"/>
+              </a:cxn>
+              <a:cxn ang="0">
+                <a:pos x="connsiteX1" y="connsiteY1"/>
+              </a:cxn>
+              <a:cxn ang="0">
+                <a:pos x="connsiteX2" y="connsiteY2"/>
+              </a:cxn>
+            </a:cxnLst>
+            <a:rect l="l" t="t" r="r" b="b"/>
+            <a:pathLst>
+              <a:path w="661932" h="958241">
+                <a:moveTo>
+                  <a:pt x="283019" y="0"/>
+                </a:moveTo>
+                <a:cubicBezTo>
+                  <a:pt x="116788" y="317848"/>
+                  <a:pt x="-49442" y="635696"/>
+                  <a:pt x="13710" y="795403"/>
+                </a:cubicBezTo>
+                <a:cubicBezTo>
+                  <a:pt x="76862" y="955110"/>
+                  <a:pt x="524146" y="958241"/>
+                  <a:pt x="661932" y="958241"/>
+                </a:cubicBezTo>
+              </a:path>
+            </a:pathLst>
+          </a:custGeom>
+          <a:noFill/>
+          <a:ln cap="rnd">
+            <a:solidFill>
+              <a:schemeClr val="accent1"/>
+            </a:solidFill>
+            <a:round/>
+            <a:tailEnd type="stealth" w="lg" len="lg"/>
+          </a:ln>
+        </p:spPr>
+        <p:style>
+          <a:lnRef idx="2">
+            <a:schemeClr val="accent1">
+              <a:shade val="15000"/>
+            </a:schemeClr>
+          </a:lnRef>
+          <a:fillRef idx="1">
+            <a:schemeClr val="accent1"/>
+          </a:fillRef>
+          <a:effectRef idx="0">
+            <a:schemeClr val="accent1"/>
+          </a:effectRef>
+          <a:fontRef idx="minor">
+            <a:schemeClr val="lt1"/>
+          </a:fontRef>
+        </p:style>
+        <p:txBody>
+          <a:bodyPr rtlCol="0" anchor="ctr"/>
+          <a:lstStyle/>
+          <a:p>
+            <a:pPr algn="ctr"/>
+            <a:endParaRPr lang="de-DE"/>
+          </a:p>
+        </p:txBody>
+      </p:sp>
+      <p:sp>
+        <p:nvSpPr>
+          <p:cNvPr id="127" name="Freihandform: Form 126">
+            <a:extLst>
+              <a:ext uri="{FF2B5EF4-FFF2-40B4-BE49-F238E27FC236}">
+                <a16:creationId xmlns:a16="http://schemas.microsoft.com/office/drawing/2014/main" id="{B173488B-A780-50C3-CF65-B20F5F8D73AA}"/>
+              </a:ext>
+            </a:extLst>
+          </p:cNvPr>
+          <p:cNvSpPr/>
+          <p:nvPr/>
+        </p:nvSpPr>
+        <p:spPr>
+          <a:xfrm>
+            <a:off x="2241778" y="948289"/>
+            <a:ext cx="422617" cy="877513"/>
+          </a:xfrm>
+          <a:custGeom>
+            <a:avLst/>
+            <a:gdLst>
+              <a:gd name="connsiteX0" fmla="*/ 212806 w 422617"/>
+              <a:gd name="connsiteY0" fmla="*/ 0 h 877513"/>
+              <a:gd name="connsiteX1" fmla="*/ 6127 w 422617"/>
+              <a:gd name="connsiteY1" fmla="*/ 735904 h 877513"/>
+              <a:gd name="connsiteX2" fmla="*/ 422617 w 422617"/>
+              <a:gd name="connsiteY2" fmla="*/ 876822 h 877513"/>
+            </a:gdLst>
+            <a:ahLst/>
+            <a:cxnLst>
+              <a:cxn ang="0">
+                <a:pos x="connsiteX0" y="connsiteY0"/>
+              </a:cxn>
+              <a:cxn ang="0">
+                <a:pos x="connsiteX1" y="connsiteY1"/>
+              </a:cxn>
+              <a:cxn ang="0">
+                <a:pos x="connsiteX2" y="connsiteY2"/>
+              </a:cxn>
+            </a:cxnLst>
+            <a:rect l="l" t="t" r="r" b="b"/>
+            <a:pathLst>
+              <a:path w="422617" h="877513">
+                <a:moveTo>
+                  <a:pt x="212806" y="0"/>
+                </a:moveTo>
+                <a:cubicBezTo>
+                  <a:pt x="91982" y="294883"/>
+                  <a:pt x="-28842" y="589767"/>
+                  <a:pt x="6127" y="735904"/>
+                </a:cubicBezTo>
+                <a:cubicBezTo>
+                  <a:pt x="41096" y="882041"/>
+                  <a:pt x="231856" y="879431"/>
+                  <a:pt x="422617" y="876822"/>
+                </a:cubicBezTo>
+              </a:path>
+            </a:pathLst>
+          </a:custGeom>
+          <a:noFill/>
+          <a:ln cap="rnd">
+            <a:solidFill>
+              <a:schemeClr val="accent1"/>
+            </a:solidFill>
+            <a:round/>
+            <a:tailEnd type="stealth" w="lg" len="lg"/>
+          </a:ln>
+        </p:spPr>
+        <p:style>
+          <a:lnRef idx="2">
+            <a:schemeClr val="accent1">
+              <a:shade val="15000"/>
+            </a:schemeClr>
+          </a:lnRef>
+          <a:fillRef idx="1">
+            <a:schemeClr val="accent1"/>
+          </a:fillRef>
+          <a:effectRef idx="0">
+            <a:schemeClr val="accent1"/>
+          </a:effectRef>
+          <a:fontRef idx="minor">
+            <a:schemeClr val="lt1"/>
+          </a:fontRef>
+        </p:style>
+        <p:txBody>
+          <a:bodyPr rtlCol="0" anchor="ctr"/>
+          <a:lstStyle/>
+          <a:p>
+            <a:pPr algn="ctr"/>
+            <a:endParaRPr lang="de-DE"/>
+          </a:p>
+        </p:txBody>
+      </p:sp>
+      <p:cxnSp>
+        <p:nvCxnSpPr>
+          <p:cNvPr id="129" name="Gerade Verbindung mit Pfeil 128">
+            <a:extLst>
+              <a:ext uri="{FF2B5EF4-FFF2-40B4-BE49-F238E27FC236}">
+                <a16:creationId xmlns:a16="http://schemas.microsoft.com/office/drawing/2014/main" id="{EDD09EDA-BA1C-F483-0391-35781A13A50D}"/>
+              </a:ext>
+            </a:extLst>
+          </p:cNvPr>
+          <p:cNvCxnSpPr>
+            <a:cxnSpLocks/>
+          </p:cNvCxnSpPr>
+          <p:nvPr/>
+        </p:nvCxnSpPr>
+        <p:spPr>
+          <a:xfrm>
+            <a:off x="866438" y="1420994"/>
+            <a:ext cx="415330" cy="0"/>
+          </a:xfrm>
+          <a:prstGeom prst="straightConnector1">
+            <a:avLst/>
+          </a:prstGeom>
+          <a:ln cap="rnd">
+            <a:solidFill>
+              <a:schemeClr val="accent2">
+                <a:lumMod val="75000"/>
+              </a:schemeClr>
+            </a:solidFill>
+            <a:round/>
+            <a:tailEnd type="stealth" w="lg" len="lg"/>
+          </a:ln>
+        </p:spPr>
+        <p:style>
+          <a:lnRef idx="2">
+            <a:schemeClr val="accent1"/>
+          </a:lnRef>
+          <a:fillRef idx="0">
+            <a:schemeClr val="accent1"/>
+          </a:fillRef>
+          <a:effectRef idx="1">
+            <a:schemeClr val="accent1"/>
+          </a:effectRef>
+          <a:fontRef idx="minor">
+            <a:schemeClr val="tx1"/>
+          </a:fontRef>
+        </p:style>
+      </p:cxnSp>
+      <p:cxnSp>
+        <p:nvCxnSpPr>
+          <p:cNvPr id="131" name="Gerade Verbindung mit Pfeil 130">
+            <a:extLst>
+              <a:ext uri="{FF2B5EF4-FFF2-40B4-BE49-F238E27FC236}">
+                <a16:creationId xmlns:a16="http://schemas.microsoft.com/office/drawing/2014/main" id="{E8ED8D4E-BF72-01FE-4250-29958BD8AE87}"/>
+              </a:ext>
+            </a:extLst>
+          </p:cNvPr>
+          <p:cNvCxnSpPr>
+            <a:cxnSpLocks/>
+          </p:cNvCxnSpPr>
+          <p:nvPr/>
+        </p:nvCxnSpPr>
+        <p:spPr>
+          <a:xfrm flipH="1">
+            <a:off x="1627877" y="1420994"/>
+            <a:ext cx="787391" cy="0"/>
+          </a:xfrm>
+          <a:prstGeom prst="straightConnector1">
+            <a:avLst/>
+          </a:prstGeom>
+          <a:ln cap="rnd">
+            <a:solidFill>
+              <a:schemeClr val="accent2">
+                <a:lumMod val="75000"/>
+              </a:schemeClr>
+            </a:solidFill>
+            <a:round/>
+            <a:tailEnd type="stealth" w="lg" len="lg"/>
+          </a:ln>
+        </p:spPr>
+        <p:style>
+          <a:lnRef idx="2">
+            <a:schemeClr val="accent1"/>
+          </a:lnRef>
+          <a:fillRef idx="0">
+            <a:schemeClr val="accent1"/>
+          </a:fillRef>
+          <a:effectRef idx="1">
+            <a:schemeClr val="accent1"/>
+          </a:effectRef>
+          <a:fontRef idx="minor">
+            <a:schemeClr val="tx1"/>
+          </a:fontRef>
+        </p:style>
+      </p:cxnSp>
+      <p:sp>
+        <p:nvSpPr>
+          <p:cNvPr id="134" name="Textfeld 133">
+            <a:extLst>
+              <a:ext uri="{FF2B5EF4-FFF2-40B4-BE49-F238E27FC236}">
+                <a16:creationId xmlns:a16="http://schemas.microsoft.com/office/drawing/2014/main" id="{BBAB9F5C-1A2A-CE72-4D48-3579BEBFADD8}"/>
+              </a:ext>
+            </a:extLst>
+          </p:cNvPr>
+          <p:cNvSpPr txBox="1"/>
+          <p:nvPr/>
+        </p:nvSpPr>
+        <p:spPr>
+          <a:xfrm>
+            <a:off x="122057" y="1264663"/>
+            <a:ext cx="735906" cy="338554"/>
+          </a:xfrm>
+          <a:prstGeom prst="rect">
+            <a:avLst/>
+          </a:prstGeom>
+          <a:noFill/>
+        </p:spPr>
+        <p:txBody>
+          <a:bodyPr wrap="square" rtlCol="0">
+            <a:spAutoFit/>
+          </a:bodyPr>
+          <a:lstStyle/>
+          <a:p>
+            <a:pPr algn="ctr"/>
+            <a:r>
+              <a:rPr lang="de-DE" sz="1600" i="1" dirty="0">
+                <a:solidFill>
+                  <a:schemeClr val="accent2">
+                    <a:lumMod val="75000"/>
+                  </a:schemeClr>
+                </a:solidFill>
+                <a:latin typeface="CMU Serif" panose="02000603000000000000" pitchFamily="2" charset="0"/>
+                <a:ea typeface="CMU Serif" panose="02000603000000000000" pitchFamily="2" charset="0"/>
+                <a:cs typeface="CMU Serif" panose="02000603000000000000" pitchFamily="2" charset="0"/>
+              </a:rPr>
+              <a:t>C </a:t>
+            </a:r>
+            <a:r>
+              <a:rPr lang="de-DE" sz="1600" dirty="0">
+                <a:solidFill>
+                  <a:schemeClr val="accent2">
+                    <a:lumMod val="75000"/>
+                  </a:schemeClr>
+                </a:solidFill>
+                <a:latin typeface="CMU Serif" panose="02000603000000000000" pitchFamily="2" charset="0"/>
+                <a:ea typeface="CMU Serif" panose="02000603000000000000" pitchFamily="2" charset="0"/>
+                <a:cs typeface="CMU Serif" panose="02000603000000000000" pitchFamily="2" charset="0"/>
+              </a:rPr>
+              <a:t>= 0</a:t>
+            </a:r>
+          </a:p>
+        </p:txBody>
+      </p:sp>
+      <p:sp>
+        <p:nvSpPr>
+          <p:cNvPr id="135" name="Textfeld 134">
+            <a:extLst>
+              <a:ext uri="{FF2B5EF4-FFF2-40B4-BE49-F238E27FC236}">
+                <a16:creationId xmlns:a16="http://schemas.microsoft.com/office/drawing/2014/main" id="{EA48DE66-D511-9545-3756-AF20756EDFC0}"/>
+              </a:ext>
+            </a:extLst>
+          </p:cNvPr>
+          <p:cNvSpPr txBox="1"/>
+          <p:nvPr/>
+        </p:nvSpPr>
+        <p:spPr>
+          <a:xfrm>
+            <a:off x="2382052" y="1264663"/>
+            <a:ext cx="765649" cy="338554"/>
+          </a:xfrm>
+          <a:prstGeom prst="rect">
+            <a:avLst/>
+          </a:prstGeom>
+          <a:noFill/>
+        </p:spPr>
+        <p:txBody>
+          <a:bodyPr wrap="square" rtlCol="0">
+            <a:spAutoFit/>
+          </a:bodyPr>
+          <a:lstStyle/>
+          <a:p>
+            <a:pPr algn="ctr"/>
+            <a:r>
+              <a:rPr lang="de-DE" sz="1600" i="1" dirty="0">
+                <a:solidFill>
+                  <a:schemeClr val="accent2">
+                    <a:lumMod val="75000"/>
+                  </a:schemeClr>
+                </a:solidFill>
+                <a:latin typeface="CMU Serif" panose="02000603000000000000" pitchFamily="2" charset="0"/>
+                <a:ea typeface="CMU Serif" panose="02000603000000000000" pitchFamily="2" charset="0"/>
+                <a:cs typeface="CMU Serif" panose="02000603000000000000" pitchFamily="2" charset="0"/>
+              </a:rPr>
+              <a:t>C </a:t>
+            </a:r>
+            <a:r>
+              <a:rPr lang="de-DE" sz="1600" dirty="0">
+                <a:solidFill>
+                  <a:schemeClr val="accent2">
+                    <a:lumMod val="75000"/>
+                  </a:schemeClr>
+                </a:solidFill>
+                <a:latin typeface="CMU Serif" panose="02000603000000000000" pitchFamily="2" charset="0"/>
+                <a:ea typeface="CMU Serif" panose="02000603000000000000" pitchFamily="2" charset="0"/>
+                <a:cs typeface="CMU Serif" panose="02000603000000000000" pitchFamily="2" charset="0"/>
+              </a:rPr>
+              <a:t>= 0</a:t>
+            </a:r>
+          </a:p>
+        </p:txBody>
+      </p:sp>
+      <p:sp>
+        <p:nvSpPr>
+          <p:cNvPr id="142" name="Textfeld 141">
+            <a:extLst>
+              <a:ext uri="{FF2B5EF4-FFF2-40B4-BE49-F238E27FC236}">
+                <a16:creationId xmlns:a16="http://schemas.microsoft.com/office/drawing/2014/main" id="{0F1B12ED-595B-6422-8ADD-5C9A63193E47}"/>
+              </a:ext>
+            </a:extLst>
+          </p:cNvPr>
+          <p:cNvSpPr txBox="1"/>
+          <p:nvPr/>
+        </p:nvSpPr>
+        <p:spPr>
+          <a:xfrm>
+            <a:off x="852397" y="2660951"/>
+            <a:ext cx="1882421" cy="369332"/>
+          </a:xfrm>
+          <a:prstGeom prst="rect">
+            <a:avLst/>
+          </a:prstGeom>
+          <a:noFill/>
+        </p:spPr>
+        <p:txBody>
+          <a:bodyPr wrap="square" rtlCol="0">
+            <a:spAutoFit/>
+          </a:bodyPr>
+          <a:lstStyle/>
+          <a:p>
+            <a:pPr algn="ctr"/>
+            <a:r>
+              <a:rPr lang="de-DE" i="1" dirty="0">
+                <a:latin typeface="CMU Serif" panose="02000603000000000000" pitchFamily="2" charset="0"/>
+                <a:ea typeface="CMU Serif" panose="02000603000000000000" pitchFamily="2" charset="0"/>
+                <a:cs typeface="CMU Serif" panose="02000603000000000000" pitchFamily="2" charset="0"/>
+              </a:rPr>
+              <a:t>k </a:t>
+            </a:r>
+            <a:r>
+              <a:rPr lang="de-DE" dirty="0">
+                <a:latin typeface="CMU Serif" panose="02000603000000000000" pitchFamily="2" charset="0"/>
+                <a:ea typeface="CMU Serif" panose="02000603000000000000" pitchFamily="2" charset="0"/>
+                <a:cs typeface="CMU Serif" panose="02000603000000000000" pitchFamily="2" charset="0"/>
+              </a:rPr>
+              <a:t>= 0, </a:t>
+            </a:r>
+            <a:r>
+              <a:rPr lang="el-GR" i="1" dirty="0">
+                <a:latin typeface="CMU Serif Extra" panose="02000603000000000000" pitchFamily="2" charset="0"/>
+                <a:ea typeface="CMU Serif Extra" panose="02000603000000000000" pitchFamily="2" charset="0"/>
+                <a:cs typeface="CMU Serif Extra" panose="02000603000000000000" pitchFamily="2" charset="0"/>
+              </a:rPr>
+              <a:t>φ</a:t>
+            </a:r>
+            <a:r>
+              <a:rPr lang="de-DE" baseline="-25000" dirty="0">
+                <a:latin typeface="CMU Serif" panose="02000603000000000000" pitchFamily="2" charset="0"/>
+                <a:ea typeface="CMU Serif" panose="02000603000000000000" pitchFamily="2" charset="0"/>
+                <a:cs typeface="CMU Serif" panose="02000603000000000000" pitchFamily="2" charset="0"/>
+              </a:rPr>
+              <a:t>0,n</a:t>
+            </a:r>
+            <a:r>
+              <a:rPr lang="de-DE" dirty="0">
+                <a:latin typeface="CMU Serif" panose="02000603000000000000" pitchFamily="2" charset="0"/>
+                <a:ea typeface="CMU Serif" panose="02000603000000000000" pitchFamily="2" charset="0"/>
+                <a:cs typeface="CMU Serif" panose="02000603000000000000" pitchFamily="2" charset="0"/>
+              </a:rPr>
+              <a:t> = 0</a:t>
+            </a:r>
+          </a:p>
+        </p:txBody>
+      </p:sp>
+      <p:grpSp>
+        <p:nvGrpSpPr>
+          <p:cNvPr id="151" name="Gruppieren 150">
+            <a:extLst>
+              <a:ext uri="{FF2B5EF4-FFF2-40B4-BE49-F238E27FC236}">
+                <a16:creationId xmlns:a16="http://schemas.microsoft.com/office/drawing/2014/main" id="{0BF99A0C-E1FB-D5C0-C56E-8C96A7075C27}"/>
+              </a:ext>
+            </a:extLst>
+          </p:cNvPr>
+          <p:cNvGrpSpPr/>
+          <p:nvPr/>
+        </p:nvGrpSpPr>
+        <p:grpSpPr>
+          <a:xfrm>
+            <a:off x="1466944" y="391953"/>
+            <a:ext cx="1641008" cy="617699"/>
+            <a:chOff x="1110631" y="327294"/>
+            <a:chExt cx="1641008" cy="617699"/>
+          </a:xfrm>
+        </p:grpSpPr>
+        <p:sp>
+          <p:nvSpPr>
+            <p:cNvPr id="143" name="Textfeld 142">
+              <a:extLst>
+                <a:ext uri="{FF2B5EF4-FFF2-40B4-BE49-F238E27FC236}">
+                  <a16:creationId xmlns:a16="http://schemas.microsoft.com/office/drawing/2014/main" id="{98BB9CA9-BCBD-F1BA-3305-C2BD79630F0A}"/>
+                </a:ext>
+              </a:extLst>
+            </p:cNvPr>
+            <p:cNvSpPr txBox="1"/>
+            <p:nvPr/>
+          </p:nvSpPr>
+          <p:spPr>
+            <a:xfrm>
+              <a:off x="1110631" y="444945"/>
+              <a:ext cx="1496367" cy="369332"/>
+            </a:xfrm>
+            <a:prstGeom prst="rect">
+              <a:avLst/>
+            </a:prstGeom>
+            <a:noFill/>
+          </p:spPr>
+          <p:txBody>
+            <a:bodyPr wrap="square" rtlCol="0">
+              <a:spAutoFit/>
+            </a:bodyPr>
+            <a:lstStyle/>
+            <a:p>
+              <a:pPr algn="ctr"/>
+              <a:r>
+                <a:rPr lang="de-DE" i="1" dirty="0">
+                  <a:latin typeface="CMU Serif" panose="02000603000000000000" pitchFamily="2" charset="0"/>
+                  <a:ea typeface="CMU Serif" panose="02000603000000000000" pitchFamily="2" charset="0"/>
+                  <a:cs typeface="CMU Serif" panose="02000603000000000000" pitchFamily="2" charset="0"/>
+                </a:rPr>
+                <a:t>k </a:t>
+              </a:r>
+              <a:r>
+                <a:rPr lang="de-DE" dirty="0">
+                  <a:latin typeface="CMU Serif" panose="02000603000000000000" pitchFamily="2" charset="0"/>
+                  <a:ea typeface="CMU Serif" panose="02000603000000000000" pitchFamily="2" charset="0"/>
+                  <a:cs typeface="CMU Serif" panose="02000603000000000000" pitchFamily="2" charset="0"/>
+                </a:rPr>
+                <a:t>= 1, </a:t>
+              </a:r>
+              <a:r>
+                <a:rPr lang="el-GR" i="1" dirty="0">
+                  <a:latin typeface="CMU Serif Extra" panose="02000603000000000000" pitchFamily="2" charset="0"/>
+                  <a:ea typeface="CMU Serif Extra" panose="02000603000000000000" pitchFamily="2" charset="0"/>
+                  <a:cs typeface="CMU Serif Extra" panose="02000603000000000000" pitchFamily="2" charset="0"/>
+                </a:rPr>
+                <a:t>φ</a:t>
+              </a:r>
+              <a:r>
+                <a:rPr lang="de-DE" baseline="-25000" dirty="0">
+                  <a:latin typeface="CMU Serif" panose="02000603000000000000" pitchFamily="2" charset="0"/>
+                  <a:ea typeface="CMU Serif" panose="02000603000000000000" pitchFamily="2" charset="0"/>
+                  <a:cs typeface="CMU Serif" panose="02000603000000000000" pitchFamily="2" charset="0"/>
+                </a:rPr>
+                <a:t>1,n</a:t>
+              </a:r>
+              <a:r>
+                <a:rPr lang="de-DE" dirty="0">
+                  <a:latin typeface="CMU Serif" panose="02000603000000000000" pitchFamily="2" charset="0"/>
+                  <a:ea typeface="CMU Serif" panose="02000603000000000000" pitchFamily="2" charset="0"/>
+                  <a:cs typeface="CMU Serif" panose="02000603000000000000" pitchFamily="2" charset="0"/>
+                </a:rPr>
+                <a:t> =</a:t>
+              </a:r>
+            </a:p>
+          </p:txBody>
+        </p:sp>
+        <p:sp>
+          <p:nvSpPr>
+            <p:cNvPr id="144" name="Textfeld 143">
+              <a:extLst>
+                <a:ext uri="{FF2B5EF4-FFF2-40B4-BE49-F238E27FC236}">
+                  <a16:creationId xmlns:a16="http://schemas.microsoft.com/office/drawing/2014/main" id="{03E0CE5B-A924-5FF2-5236-3E085A74B926}"/>
+                </a:ext>
+              </a:extLst>
+            </p:cNvPr>
+            <p:cNvSpPr txBox="1"/>
+            <p:nvPr/>
+          </p:nvSpPr>
+          <p:spPr>
+            <a:xfrm>
+              <a:off x="2534437" y="327294"/>
+              <a:ext cx="205419" cy="369332"/>
+            </a:xfrm>
+            <a:prstGeom prst="rect">
+              <a:avLst/>
+            </a:prstGeom>
+            <a:noFill/>
+          </p:spPr>
+          <p:txBody>
+            <a:bodyPr wrap="square" rtlCol="0">
+              <a:spAutoFit/>
+            </a:bodyPr>
+            <a:lstStyle/>
+            <a:p>
+              <a:pPr algn="ctr"/>
+              <a:r>
+                <a:rPr lang="de-DE" i="1" dirty="0">
+                  <a:latin typeface="CMU Serif Extra" panose="02000603000000000000" pitchFamily="2" charset="0"/>
+                  <a:ea typeface="CMU Serif Extra" panose="02000603000000000000" pitchFamily="2" charset="0"/>
+                  <a:cs typeface="CMU Serif Extra" panose="02000603000000000000" pitchFamily="2" charset="0"/>
+                </a:rPr>
+                <a:t>π</a:t>
+              </a:r>
+            </a:p>
+          </p:txBody>
+        </p:sp>
+        <p:sp>
+          <p:nvSpPr>
+            <p:cNvPr id="145" name="Textfeld 144">
+              <a:extLst>
+                <a:ext uri="{FF2B5EF4-FFF2-40B4-BE49-F238E27FC236}">
+                  <a16:creationId xmlns:a16="http://schemas.microsoft.com/office/drawing/2014/main" id="{F2B686E0-2112-A933-24A4-59884C994244}"/>
+                </a:ext>
+              </a:extLst>
+            </p:cNvPr>
+            <p:cNvSpPr txBox="1"/>
+            <p:nvPr/>
+          </p:nvSpPr>
+          <p:spPr>
+            <a:xfrm>
+              <a:off x="2537569" y="575661"/>
+              <a:ext cx="205419" cy="369332"/>
+            </a:xfrm>
+            <a:prstGeom prst="rect">
+              <a:avLst/>
+            </a:prstGeom>
+            <a:noFill/>
+          </p:spPr>
+          <p:txBody>
+            <a:bodyPr wrap="square" rtlCol="0">
+              <a:spAutoFit/>
+            </a:bodyPr>
+            <a:lstStyle/>
+            <a:p>
+              <a:pPr algn="ctr"/>
+              <a:r>
+                <a:rPr lang="de-DE" i="1" dirty="0">
+                  <a:latin typeface="CMU Serif" panose="02000603000000000000" pitchFamily="2" charset="0"/>
+                  <a:ea typeface="CMU Serif" panose="02000603000000000000" pitchFamily="2" charset="0"/>
+                  <a:cs typeface="CMU Serif" panose="02000603000000000000" pitchFamily="2" charset="0"/>
+                </a:rPr>
+                <a:t>n</a:t>
+              </a:r>
+            </a:p>
+          </p:txBody>
+        </p:sp>
+        <p:sp>
+          <p:nvSpPr>
+            <p:cNvPr id="146" name="Textfeld 145">
+              <a:extLst>
+                <a:ext uri="{FF2B5EF4-FFF2-40B4-BE49-F238E27FC236}">
+                  <a16:creationId xmlns:a16="http://schemas.microsoft.com/office/drawing/2014/main" id="{1EBEDA95-30F9-C29D-CBDE-6AA5E52596FA}"/>
+                </a:ext>
+              </a:extLst>
+            </p:cNvPr>
+            <p:cNvSpPr txBox="1"/>
+            <p:nvPr/>
+          </p:nvSpPr>
+          <p:spPr>
+            <a:xfrm>
+              <a:off x="2546220" y="337375"/>
+              <a:ext cx="205419" cy="369332"/>
+            </a:xfrm>
+            <a:prstGeom prst="rect">
+              <a:avLst/>
+            </a:prstGeom>
+            <a:noFill/>
+          </p:spPr>
+          <p:txBody>
+            <a:bodyPr wrap="square" rtlCol="0">
+              <a:spAutoFit/>
+            </a:bodyPr>
+            <a:lstStyle/>
+            <a:p>
+              <a:pPr algn="ctr"/>
+              <a:r>
+                <a:rPr lang="de-DE" dirty="0">
+                  <a:latin typeface="CMU Serif" panose="02000603000000000000" pitchFamily="2" charset="0"/>
+                  <a:ea typeface="CMU Serif" panose="02000603000000000000" pitchFamily="2" charset="0"/>
+                  <a:cs typeface="CMU Serif" panose="02000603000000000000" pitchFamily="2" charset="0"/>
+                </a:rPr>
+                <a:t>_</a:t>
+              </a:r>
+            </a:p>
+          </p:txBody>
+        </p:sp>
+      </p:grpSp>
+      <p:cxnSp>
+        <p:nvCxnSpPr>
+          <p:cNvPr id="148" name="Gerader Verbinder 147">
+            <a:extLst>
+              <a:ext uri="{FF2B5EF4-FFF2-40B4-BE49-F238E27FC236}">
+                <a16:creationId xmlns:a16="http://schemas.microsoft.com/office/drawing/2014/main" id="{FDB225A3-50AC-282E-67C4-DADF31B4D95C}"/>
+              </a:ext>
+            </a:extLst>
+          </p:cNvPr>
+          <p:cNvCxnSpPr>
+            <a:cxnSpLocks/>
+          </p:cNvCxnSpPr>
+          <p:nvPr/>
+        </p:nvCxnSpPr>
+        <p:spPr>
+          <a:xfrm flipH="1">
+            <a:off x="1734593" y="810685"/>
+            <a:ext cx="311515" cy="279133"/>
+          </a:xfrm>
+          <a:prstGeom prst="line">
+            <a:avLst/>
+          </a:prstGeom>
+          <a:ln w="6350" cap="rnd">
+            <a:solidFill>
+              <a:schemeClr val="tx1"/>
+            </a:solidFill>
+            <a:round/>
+          </a:ln>
+        </p:spPr>
+        <p:style>
+          <a:lnRef idx="2">
+            <a:schemeClr val="accent1"/>
+          </a:lnRef>
+          <a:fillRef idx="0">
+            <a:schemeClr val="accent1"/>
+          </a:fillRef>
+          <a:effectRef idx="1">
+            <a:schemeClr val="accent1"/>
+          </a:effectRef>
+          <a:fontRef idx="minor">
+            <a:schemeClr val="tx1"/>
+          </a:fontRef>
+        </p:style>
+      </p:cxnSp>
+      <p:cxnSp>
+        <p:nvCxnSpPr>
+          <p:cNvPr id="154" name="Gerader Verbinder 153">
+            <a:extLst>
+              <a:ext uri="{FF2B5EF4-FFF2-40B4-BE49-F238E27FC236}">
+                <a16:creationId xmlns:a16="http://schemas.microsoft.com/office/drawing/2014/main" id="{043C8EDD-8FC3-E30A-3810-D39E668A897F}"/>
+              </a:ext>
+            </a:extLst>
+          </p:cNvPr>
+          <p:cNvCxnSpPr>
+            <a:cxnSpLocks/>
+          </p:cNvCxnSpPr>
+          <p:nvPr/>
+        </p:nvCxnSpPr>
+        <p:spPr>
+          <a:xfrm flipH="1">
+            <a:off x="1544267" y="2282854"/>
+            <a:ext cx="130669" cy="403979"/>
+          </a:xfrm>
+          <a:prstGeom prst="line">
+            <a:avLst/>
+          </a:prstGeom>
+          <a:ln w="6350" cap="rnd">
+            <a:solidFill>
+              <a:schemeClr val="tx1"/>
+            </a:solidFill>
+            <a:round/>
+          </a:ln>
+        </p:spPr>
+        <p:style>
+          <a:lnRef idx="2">
+            <a:schemeClr val="accent1"/>
+          </a:lnRef>
+          <a:fillRef idx="0">
+            <a:schemeClr val="accent1"/>
+          </a:fillRef>
+          <a:effectRef idx="1">
+            <a:schemeClr val="accent1"/>
+          </a:effectRef>
+          <a:fontRef idx="minor">
+            <a:schemeClr val="tx1"/>
+          </a:fontRef>
+        </p:style>
+      </p:cxnSp>
+    </p:spTree>
+    <p:extLst>
+      <p:ext uri="{BB962C8B-B14F-4D97-AF65-F5344CB8AC3E}">
+        <p14:creationId xmlns:p14="http://schemas.microsoft.com/office/powerpoint/2010/main" val="1544933527"/>
+      </p:ext>
+    </p:extLst>
+  </p:cSld>
+  <p:clrMapOvr>
+    <a:masterClrMapping/>
+  </p:clrMapOvr>
+</p:sld>
+</file>
+
 <file path=ppt/theme/theme1.xml><?xml version="1.0" encoding="utf-8"?>
 <a:theme xmlns:a="http://schemas.openxmlformats.org/drawingml/2006/main" name="Office">
   <a:themeElements>

</xml_diff>